<commit_message>
work in progress, travaile sur périodes
</commit_message>
<xml_diff>
--- a/presentation/presStageM2.pptx
+++ b/presentation/presStageM2.pptx
@@ -5,32 +5,35 @@
     <p:sldMasterId id="2147483654" r:id="rId1"/>
   </p:sldMasterIdLst>
   <p:notesMasterIdLst>
-    <p:notesMasterId r:id="rId25"/>
+    <p:notesMasterId r:id="rId28"/>
   </p:notesMasterIdLst>
   <p:sldIdLst>
     <p:sldId id="256" r:id="rId2"/>
     <p:sldId id="257" r:id="rId3"/>
     <p:sldId id="276" r:id="rId4"/>
     <p:sldId id="258" r:id="rId5"/>
-    <p:sldId id="259" r:id="rId6"/>
-    <p:sldId id="260" r:id="rId7"/>
-    <p:sldId id="261" r:id="rId8"/>
-    <p:sldId id="262" r:id="rId9"/>
-    <p:sldId id="263" r:id="rId10"/>
-    <p:sldId id="264" r:id="rId11"/>
-    <p:sldId id="265" r:id="rId12"/>
-    <p:sldId id="266" r:id="rId13"/>
-    <p:sldId id="277" r:id="rId14"/>
-    <p:sldId id="278" r:id="rId15"/>
-    <p:sldId id="279" r:id="rId16"/>
-    <p:sldId id="267" r:id="rId17"/>
-    <p:sldId id="268" r:id="rId18"/>
-    <p:sldId id="270" r:id="rId19"/>
-    <p:sldId id="271" r:id="rId20"/>
-    <p:sldId id="272" r:id="rId21"/>
-    <p:sldId id="280" r:id="rId22"/>
-    <p:sldId id="274" r:id="rId23"/>
-    <p:sldId id="275" r:id="rId24"/>
+    <p:sldId id="281" r:id="rId6"/>
+    <p:sldId id="259" r:id="rId7"/>
+    <p:sldId id="282" r:id="rId8"/>
+    <p:sldId id="260" r:id="rId9"/>
+    <p:sldId id="261" r:id="rId10"/>
+    <p:sldId id="262" r:id="rId11"/>
+    <p:sldId id="263" r:id="rId12"/>
+    <p:sldId id="264" r:id="rId13"/>
+    <p:sldId id="283" r:id="rId14"/>
+    <p:sldId id="265" r:id="rId15"/>
+    <p:sldId id="266" r:id="rId16"/>
+    <p:sldId id="277" r:id="rId17"/>
+    <p:sldId id="278" r:id="rId18"/>
+    <p:sldId id="279" r:id="rId19"/>
+    <p:sldId id="267" r:id="rId20"/>
+    <p:sldId id="268" r:id="rId21"/>
+    <p:sldId id="270" r:id="rId22"/>
+    <p:sldId id="271" r:id="rId23"/>
+    <p:sldId id="272" r:id="rId24"/>
+    <p:sldId id="280" r:id="rId25"/>
+    <p:sldId id="274" r:id="rId26"/>
+    <p:sldId id="275" r:id="rId27"/>
   </p:sldIdLst>
   <p:sldSz cx="9144000" cy="5143500" type="screen16x9"/>
   <p:notesSz cx="6858000" cy="9144000"/>
@@ -610,7 +613,7 @@
   <p:cSld>
     <p:spTree>
       <p:nvGrpSpPr>
-        <p:cNvPr id="1" name="Shape 80"/>
+        <p:cNvPr id="1" name="Shape 68"/>
         <p:cNvGrpSpPr/>
         <p:nvPr/>
       </p:nvGrpSpPr>
@@ -624,7 +627,7 @@
       </p:grpSpPr>
       <p:sp>
         <p:nvSpPr>
-          <p:cNvPr id="81" name="Shape 81"/>
+          <p:cNvPr id="69" name="Shape 69"/>
           <p:cNvSpPr>
             <a:spLocks noGrp="1" noRot="1" noChangeAspect="1"/>
           </p:cNvSpPr>
@@ -665,7 +668,7 @@
       </p:sp>
       <p:sp>
         <p:nvSpPr>
-          <p:cNvPr id="82" name="Shape 82"/>
+          <p:cNvPr id="70" name="Shape 70"/>
           <p:cNvSpPr txBox="1">
             <a:spLocks noGrp="1"/>
           </p:cNvSpPr>
@@ -694,7 +697,35 @@
               </a:spcBef>
               <a:buNone/>
             </a:pPr>
-            <a:endParaRPr/>
+            <a:r>
+              <a:rPr lang="fr-FR" dirty="0" smtClean="0"/>
+              <a:t>Git utilise un </a:t>
+            </a:r>
+            <a:r>
+              <a:rPr lang="fr-FR" dirty="0" err="1" smtClean="0"/>
+              <a:t>algo</a:t>
+            </a:r>
+            <a:r>
+              <a:rPr lang="fr-FR" dirty="0" smtClean="0"/>
+              <a:t> connu sous le nom de </a:t>
+            </a:r>
+            <a:r>
+              <a:rPr lang="fr-FR" dirty="0" err="1" smtClean="0"/>
+              <a:t>Origin</a:t>
+            </a:r>
+            <a:r>
+              <a:rPr lang="fr-FR" dirty="0" smtClean="0"/>
+              <a:t> </a:t>
+            </a:r>
+            <a:r>
+              <a:rPr lang="fr-FR" dirty="0" err="1" smtClean="0"/>
+              <a:t>Analysis</a:t>
+            </a:r>
+            <a:r>
+              <a:rPr lang="fr-FR" dirty="0" smtClean="0"/>
+              <a:t> pour détecter les renommages.</a:t>
+            </a:r>
+            <a:endParaRPr dirty="0"/>
           </a:p>
         </p:txBody>
       </p:sp>
@@ -711,7 +742,7 @@
   <p:cSld>
     <p:spTree>
       <p:nvGrpSpPr>
-        <p:cNvPr id="1" name="Shape 86"/>
+        <p:cNvPr id="1" name="Shape 74"/>
         <p:cNvGrpSpPr/>
         <p:nvPr/>
       </p:nvGrpSpPr>
@@ -725,7 +756,7 @@
       </p:grpSpPr>
       <p:sp>
         <p:nvSpPr>
-          <p:cNvPr id="87" name="Shape 87"/>
+          <p:cNvPr id="75" name="Shape 75"/>
           <p:cNvSpPr>
             <a:spLocks noGrp="1" noRot="1" noChangeAspect="1"/>
           </p:cNvSpPr>
@@ -766,7 +797,7 @@
       </p:sp>
       <p:sp>
         <p:nvSpPr>
-          <p:cNvPr id="88" name="Shape 88"/>
+          <p:cNvPr id="76" name="Shape 76"/>
           <p:cNvSpPr txBox="1">
             <a:spLocks noGrp="1"/>
           </p:cNvSpPr>
@@ -812,7 +843,7 @@
   <p:cSld>
     <p:spTree>
       <p:nvGrpSpPr>
-        <p:cNvPr id="1" name="Shape 93"/>
+        <p:cNvPr id="1" name="Shape 80"/>
         <p:cNvGrpSpPr/>
         <p:nvPr/>
       </p:nvGrpSpPr>
@@ -826,7 +857,7 @@
       </p:grpSpPr>
       <p:sp>
         <p:nvSpPr>
-          <p:cNvPr id="94" name="Shape 94"/>
+          <p:cNvPr id="81" name="Shape 81"/>
           <p:cNvSpPr>
             <a:spLocks noGrp="1" noRot="1" noChangeAspect="1"/>
           </p:cNvSpPr>
@@ -867,7 +898,7 @@
       </p:sp>
       <p:sp>
         <p:nvSpPr>
-          <p:cNvPr id="95" name="Shape 95"/>
+          <p:cNvPr id="82" name="Shape 82"/>
           <p:cNvSpPr txBox="1">
             <a:spLocks noGrp="1"/>
           </p:cNvSpPr>
@@ -909,11 +940,11 @@
 </file>
 
 <file path=ppt/notesSlides/notesSlide13.xml><?xml version="1.0" encoding="utf-8"?>
-<p:notes xmlns:a="http://schemas.openxmlformats.org/drawingml/2006/main" xmlns:r="http://schemas.openxmlformats.org/officeDocument/2006/relationships" xmlns:p="http://schemas.openxmlformats.org/presentationml/2006/main" showMasterSp="0" showMasterPhAnim="0">
+<p:notes xmlns:a="http://schemas.openxmlformats.org/drawingml/2006/main" xmlns:r="http://schemas.openxmlformats.org/officeDocument/2006/relationships" xmlns:p="http://schemas.openxmlformats.org/presentationml/2006/main">
   <p:cSld>
     <p:spTree>
       <p:nvGrpSpPr>
-        <p:cNvPr id="1" name="Shape 93"/>
+        <p:cNvPr id="1" name=""/>
         <p:cNvGrpSpPr/>
         <p:nvPr/>
       </p:nvGrpSpPr>
@@ -927,7 +958,113 @@
       </p:grpSpPr>
       <p:sp>
         <p:nvSpPr>
-          <p:cNvPr id="94" name="Shape 94"/>
+          <p:cNvPr id="2" name="Slide Image Placeholder 1"/>
+          <p:cNvSpPr>
+            <a:spLocks noGrp="1" noRot="1" noChangeAspect="1"/>
+          </p:cNvSpPr>
+          <p:nvPr>
+            <p:ph type="sldImg"/>
+          </p:nvPr>
+        </p:nvSpPr>
+        <p:spPr>
+          <a:xfrm>
+            <a:off x="381000" y="685800"/>
+            <a:ext cx="6096000" cy="3429000"/>
+          </a:xfrm>
+        </p:spPr>
+      </p:sp>
+      <p:sp>
+        <p:nvSpPr>
+          <p:cNvPr id="3" name="Notes Placeholder 2"/>
+          <p:cNvSpPr>
+            <a:spLocks noGrp="1"/>
+          </p:cNvSpPr>
+          <p:nvPr>
+            <p:ph type="body" idx="1"/>
+          </p:nvPr>
+        </p:nvSpPr>
+        <p:spPr/>
+        <p:txBody>
+          <a:bodyPr/>
+          <a:lstStyle/>
+          <a:p>
+            <a:pPr marL="0" marR="0" indent="0" algn="l" defTabSz="914400" rtl="0" eaLnBrk="1" fontAlgn="auto" latinLnBrk="0" hangingPunct="1">
+              <a:lnSpc>
+                <a:spcPct val="100000"/>
+              </a:lnSpc>
+              <a:spcBef>
+                <a:spcPts val="0"/>
+              </a:spcBef>
+              <a:spcAft>
+                <a:spcPts val="0"/>
+              </a:spcAft>
+              <a:buClrTx/>
+              <a:buSzTx/>
+              <a:buFontTx/>
+              <a:buNone/>
+              <a:tabLst/>
+              <a:defRPr/>
+            </a:pPr>
+            <a:r>
+              <a:rPr lang="fr-FR" baseline="0" dirty="0" smtClean="0"/>
+              <a:t>Nous avons montré qu’en Théorie, le calcul des métriques peut être faussé par le renommage, dans les projets d’aujourd’hui qui n’utilisent pas Git ou qui ne détecte pas ce renommage. Et bien qu’il soit de notoriété commune que le </a:t>
+            </a:r>
+            <a:r>
+              <a:rPr lang="fr-FR" baseline="0" dirty="0" err="1" smtClean="0"/>
+              <a:t>refactoring</a:t>
+            </a:r>
+            <a:r>
+              <a:rPr lang="fr-FR" baseline="0" dirty="0" smtClean="0"/>
+              <a:t>, </a:t>
+            </a:r>
+            <a:r>
+              <a:rPr lang="fr-FR" sz="1100" b="0" i="0" u="none" strike="noStrike" kern="1200" baseline="0" dirty="0" smtClean="0">
+                <a:solidFill>
+                  <a:schemeClr val="tx1"/>
+                </a:solidFill>
+                <a:latin typeface="+mn-lt"/>
+                <a:ea typeface="+mn-ea"/>
+                <a:cs typeface="+mn-cs"/>
+              </a:rPr>
+              <a:t>modifications architecturales (dont le renommage d’entités) qui permettent d’améliorer ou restructurer le code source, sont une pratique courante dans le développement logiciel, nous ne connaissons ni la quantité de renommages ni son impact réel dans les projets.</a:t>
+            </a:r>
+            <a:endParaRPr lang="fr-FR" dirty="0" smtClean="0"/>
+          </a:p>
+        </p:txBody>
+      </p:sp>
+    </p:spTree>
+    <p:extLst>
+      <p:ext uri="{BB962C8B-B14F-4D97-AF65-F5344CB8AC3E}">
+        <p14:creationId xmlns:p14="http://schemas.microsoft.com/office/powerpoint/2010/main" val="1149294144"/>
+      </p:ext>
+    </p:extLst>
+  </p:cSld>
+  <p:clrMapOvr>
+    <a:masterClrMapping/>
+  </p:clrMapOvr>
+</p:notes>
+</file>
+
+<file path=ppt/notesSlides/notesSlide14.xml><?xml version="1.0" encoding="utf-8"?>
+<p:notes xmlns:a="http://schemas.openxmlformats.org/drawingml/2006/main" xmlns:r="http://schemas.openxmlformats.org/officeDocument/2006/relationships" xmlns:p="http://schemas.openxmlformats.org/presentationml/2006/main" showMasterSp="0" showMasterPhAnim="0">
+  <p:cSld>
+    <p:spTree>
+      <p:nvGrpSpPr>
+        <p:cNvPr id="1" name="Shape 86"/>
+        <p:cNvGrpSpPr/>
+        <p:nvPr/>
+      </p:nvGrpSpPr>
+      <p:grpSpPr>
+        <a:xfrm>
+          <a:off x="0" y="0"/>
+          <a:ext cx="0" cy="0"/>
+          <a:chOff x="0" y="0"/>
+          <a:chExt cx="0" cy="0"/>
+        </a:xfrm>
+      </p:grpSpPr>
+      <p:sp>
+        <p:nvSpPr>
+          <p:cNvPr id="87" name="Shape 87"/>
           <p:cNvSpPr>
             <a:spLocks noGrp="1" noRot="1" noChangeAspect="1"/>
           </p:cNvSpPr>
@@ -968,7 +1105,7 @@
       </p:sp>
       <p:sp>
         <p:nvSpPr>
-          <p:cNvPr id="95" name="Shape 95"/>
+          <p:cNvPr id="88" name="Shape 88"/>
           <p:cNvSpPr txBox="1">
             <a:spLocks noGrp="1"/>
           </p:cNvSpPr>
@@ -997,108 +1134,19 @@
               </a:spcBef>
               <a:buNone/>
             </a:pPr>
-            <a:endParaRPr/>
-          </a:p>
-        </p:txBody>
-      </p:sp>
-    </p:spTree>
-  </p:cSld>
-  <p:clrMapOvr>
-    <a:masterClrMapping/>
-  </p:clrMapOvr>
-</p:notes>
-</file>
-
-<file path=ppt/notesSlides/notesSlide14.xml><?xml version="1.0" encoding="utf-8"?>
-<p:notes xmlns:a="http://schemas.openxmlformats.org/drawingml/2006/main" xmlns:r="http://schemas.openxmlformats.org/officeDocument/2006/relationships" xmlns:p="http://schemas.openxmlformats.org/presentationml/2006/main" showMasterSp="0" showMasterPhAnim="0">
-  <p:cSld>
-    <p:spTree>
-      <p:nvGrpSpPr>
-        <p:cNvPr id="1" name="Shape 93"/>
-        <p:cNvGrpSpPr/>
-        <p:nvPr/>
-      </p:nvGrpSpPr>
-      <p:grpSpPr>
-        <a:xfrm>
-          <a:off x="0" y="0"/>
-          <a:ext cx="0" cy="0"/>
-          <a:chOff x="0" y="0"/>
-          <a:chExt cx="0" cy="0"/>
-        </a:xfrm>
-      </p:grpSpPr>
-      <p:sp>
-        <p:nvSpPr>
-          <p:cNvPr id="94" name="Shape 94"/>
-          <p:cNvSpPr>
-            <a:spLocks noGrp="1" noRot="1" noChangeAspect="1"/>
-          </p:cNvSpPr>
-          <p:nvPr>
-            <p:ph type="sldImg" idx="2"/>
-          </p:nvPr>
-        </p:nvSpPr>
-        <p:spPr>
-          <a:xfrm>
-            <a:off x="381000" y="685800"/>
-            <a:ext cx="6096000" cy="3429000"/>
-          </a:xfrm>
-          <a:custGeom>
-            <a:avLst/>
-            <a:gdLst/>
-            <a:ahLst/>
-            <a:cxnLst/>
-            <a:rect l="0" t="0" r="0" b="0"/>
-            <a:pathLst>
-              <a:path w="120000" h="120000" extrusionOk="0">
-                <a:moveTo>
-                  <a:pt x="0" y="0"/>
-                </a:moveTo>
-                <a:lnTo>
-                  <a:pt x="120000" y="0"/>
-                </a:lnTo>
-                <a:lnTo>
-                  <a:pt x="120000" y="120000"/>
-                </a:lnTo>
-                <a:lnTo>
-                  <a:pt x="0" y="120000"/>
-                </a:lnTo>
-                <a:close/>
-              </a:path>
-            </a:pathLst>
-          </a:custGeom>
-        </p:spPr>
-      </p:sp>
-      <p:sp>
-        <p:nvSpPr>
-          <p:cNvPr id="95" name="Shape 95"/>
-          <p:cNvSpPr txBox="1">
-            <a:spLocks noGrp="1"/>
-          </p:cNvSpPr>
-          <p:nvPr>
-            <p:ph type="body" idx="1"/>
-          </p:nvPr>
-        </p:nvSpPr>
-        <p:spPr>
-          <a:xfrm>
-            <a:off x="685800" y="4343400"/>
-            <a:ext cx="5486399" cy="4114800"/>
-          </a:xfrm>
-          <a:prstGeom prst="rect">
-            <a:avLst/>
-          </a:prstGeom>
-        </p:spPr>
-        <p:txBody>
-          <a:bodyPr lIns="91425" tIns="91425" rIns="91425" bIns="91425" anchor="t" anchorCtr="0">
-            <a:noAutofit/>
-          </a:bodyPr>
-          <a:lstStyle/>
-          <a:p>
-            <a:pPr>
-              <a:spcBef>
-                <a:spcPts val="0"/>
-              </a:spcBef>
-              <a:buNone/>
-            </a:pPr>
-            <a:endParaRPr/>
+            <a:r>
+              <a:rPr lang="fr-FR" dirty="0" smtClean="0"/>
+              <a:t>Pour faire nos propres expérimentations nous avons besoin d’un corpus de projets.  Projets open source, Git, langages différent et une taille et </a:t>
+            </a:r>
+            <a:r>
+              <a:rPr lang="fr-FR" dirty="0" err="1" smtClean="0"/>
+              <a:t>NoD</a:t>
+            </a:r>
+            <a:r>
+              <a:rPr lang="fr-FR" dirty="0" smtClean="0"/>
+              <a:t> conséquent.</a:t>
+            </a:r>
+            <a:endParaRPr dirty="0"/>
           </a:p>
         </p:txBody>
       </p:sp>
@@ -1193,13 +1241,18 @@
           </a:bodyPr>
           <a:lstStyle/>
           <a:p>
-            <a:pPr>
-              <a:spcBef>
-                <a:spcPts val="0"/>
-              </a:spcBef>
-              <a:buNone/>
-            </a:pPr>
-            <a:endParaRPr/>
+            <a:r>
+              <a:rPr lang="fr-FR" sz="1100" b="0" i="0" u="none" strike="noStrike" kern="1200" baseline="0" dirty="0" smtClean="0">
+                <a:solidFill>
+                  <a:schemeClr val="tx1"/>
+                </a:solidFill>
+                <a:latin typeface="+mn-lt"/>
+                <a:ea typeface="+mn-ea"/>
+                <a:cs typeface="+mn-cs"/>
+              </a:rPr>
+              <a:t>Le but de la première expérience et de calculer la quantité de renommage durant les périodes de développement des logiciels. Ici, on a la période de développement d’un logiciel.</a:t>
+            </a:r>
+            <a:endParaRPr dirty="0"/>
           </a:p>
         </p:txBody>
       </p:sp>
@@ -1216,7 +1269,7 @@
   <p:cSld>
     <p:spTree>
       <p:nvGrpSpPr>
-        <p:cNvPr id="1" name="Shape 99"/>
+        <p:cNvPr id="1" name="Shape 93"/>
         <p:cNvGrpSpPr/>
         <p:nvPr/>
       </p:nvGrpSpPr>
@@ -1230,7 +1283,7 @@
       </p:grpSpPr>
       <p:sp>
         <p:nvSpPr>
-          <p:cNvPr id="100" name="Shape 100"/>
+          <p:cNvPr id="94" name="Shape 94"/>
           <p:cNvSpPr>
             <a:spLocks noGrp="1" noRot="1" noChangeAspect="1"/>
           </p:cNvSpPr>
@@ -1271,7 +1324,7 @@
       </p:sp>
       <p:sp>
         <p:nvSpPr>
-          <p:cNvPr id="101" name="Shape 101"/>
+          <p:cNvPr id="95" name="Shape 95"/>
           <p:cNvSpPr txBox="1">
             <a:spLocks noGrp="1"/>
           </p:cNvSpPr>
@@ -1300,7 +1353,15 @@
               </a:spcBef>
               <a:buNone/>
             </a:pPr>
-            <a:endParaRPr/>
+            <a:r>
+              <a:rPr lang="fr-FR" dirty="0" smtClean="0"/>
+              <a:t>Il faut savoir que régulièrement, les</a:t>
+            </a:r>
+            <a:r>
+              <a:rPr lang="fr-FR" baseline="0" dirty="0" smtClean="0"/>
+              <a:t> versions stables sont maintenues pour les utilisateurs.</a:t>
+            </a:r>
+            <a:endParaRPr dirty="0"/>
           </a:p>
         </p:txBody>
       </p:sp>
@@ -1317,7 +1378,7 @@
   <p:cSld>
     <p:spTree>
       <p:nvGrpSpPr>
-        <p:cNvPr id="1" name="Shape 105"/>
+        <p:cNvPr id="1" name="Shape 93"/>
         <p:cNvGrpSpPr/>
         <p:nvPr/>
       </p:nvGrpSpPr>
@@ -1331,7 +1392,7 @@
       </p:grpSpPr>
       <p:sp>
         <p:nvSpPr>
-          <p:cNvPr id="106" name="Shape 106"/>
+          <p:cNvPr id="94" name="Shape 94"/>
           <p:cNvSpPr>
             <a:spLocks noGrp="1" noRot="1" noChangeAspect="1"/>
           </p:cNvSpPr>
@@ -1372,7 +1433,7 @@
       </p:sp>
       <p:sp>
         <p:nvSpPr>
-          <p:cNvPr id="107" name="Shape 107"/>
+          <p:cNvPr id="95" name="Shape 95"/>
           <p:cNvSpPr txBox="1">
             <a:spLocks noGrp="1"/>
           </p:cNvSpPr>
@@ -1401,7 +1462,15 @@
               </a:spcBef>
               <a:buNone/>
             </a:pPr>
-            <a:endParaRPr/>
+            <a:r>
+              <a:rPr lang="fr-FR" dirty="0" smtClean="0"/>
+              <a:t>On a ici donc les étapes</a:t>
+            </a:r>
+            <a:r>
+              <a:rPr lang="fr-FR" baseline="0" dirty="0" smtClean="0"/>
+              <a:t> importantes du développement, les versions stables, marqué par le départ de maintenance de versions stable. Nous regardons de manière séparé la phase de développement et les phases de maintenance car nous pensons qu’il n’a pas ou très peux de renommage dans ces phases de maintenance.</a:t>
+            </a:r>
+            <a:endParaRPr dirty="0"/>
           </a:p>
         </p:txBody>
       </p:sp>
@@ -1418,7 +1487,7 @@
   <p:cSld>
     <p:spTree>
       <p:nvGrpSpPr>
-        <p:cNvPr id="1" name="Shape 117"/>
+        <p:cNvPr id="1" name="Shape 93"/>
         <p:cNvGrpSpPr/>
         <p:nvPr/>
       </p:nvGrpSpPr>
@@ -1432,7 +1501,7 @@
       </p:grpSpPr>
       <p:sp>
         <p:nvSpPr>
-          <p:cNvPr id="118" name="Shape 118"/>
+          <p:cNvPr id="94" name="Shape 94"/>
           <p:cNvSpPr>
             <a:spLocks noGrp="1" noRot="1" noChangeAspect="1"/>
           </p:cNvSpPr>
@@ -1473,7 +1542,7 @@
       </p:sp>
       <p:sp>
         <p:nvSpPr>
-          <p:cNvPr id="119" name="Shape 119"/>
+          <p:cNvPr id="95" name="Shape 95"/>
           <p:cNvSpPr txBox="1">
             <a:spLocks noGrp="1"/>
           </p:cNvSpPr>
@@ -1502,7 +1571,15 @@
               </a:spcBef>
               <a:buNone/>
             </a:pPr>
-            <a:endParaRPr/>
+            <a:r>
+              <a:rPr lang="fr-FR" dirty="0" smtClean="0"/>
+              <a:t>Nous séparons donc en période cette phase</a:t>
+            </a:r>
+            <a:r>
+              <a:rPr lang="fr-FR" baseline="0" dirty="0" smtClean="0"/>
+              <a:t> développement, entre chaque versions stable avec une période initiale qui risque de contenir de nombreux changement et restructurations.</a:t>
+            </a:r>
+            <a:endParaRPr dirty="0"/>
           </a:p>
         </p:txBody>
       </p:sp>
@@ -1519,7 +1596,7 @@
   <p:cSld>
     <p:spTree>
       <p:nvGrpSpPr>
-        <p:cNvPr id="1" name="Shape 123"/>
+        <p:cNvPr id="1" name="Shape 99"/>
         <p:cNvGrpSpPr/>
         <p:nvPr/>
       </p:nvGrpSpPr>
@@ -1533,7 +1610,7 @@
       </p:grpSpPr>
       <p:sp>
         <p:nvSpPr>
-          <p:cNvPr id="124" name="Shape 124"/>
+          <p:cNvPr id="100" name="Shape 100"/>
           <p:cNvSpPr>
             <a:spLocks noGrp="1" noRot="1" noChangeAspect="1"/>
           </p:cNvSpPr>
@@ -1574,7 +1651,7 @@
       </p:sp>
       <p:sp>
         <p:nvSpPr>
-          <p:cNvPr id="125" name="Shape 125"/>
+          <p:cNvPr id="101" name="Shape 101"/>
           <p:cNvSpPr txBox="1">
             <a:spLocks noGrp="1"/>
           </p:cNvSpPr>
@@ -1603,6 +1680,26 @@
               </a:spcBef>
               <a:buNone/>
             </a:pPr>
+            <a:r>
+              <a:rPr lang="fr-FR" dirty="0" smtClean="0"/>
+              <a:t>Voici comment nous procédons dans chaque</a:t>
+            </a:r>
+            <a:r>
+              <a:rPr lang="fr-FR" baseline="0" dirty="0" smtClean="0"/>
+              <a:t> périodes définies précédemment, </a:t>
+            </a:r>
+            <a:r>
+              <a:rPr lang="fr-FR" baseline="0" dirty="0" err="1" smtClean="0"/>
+              <a:t>grace</a:t>
+            </a:r>
+            <a:r>
+              <a:rPr lang="fr-FR" baseline="0" dirty="0" smtClean="0"/>
+              <a:t> au VCS pour obtenir nos chiffres. Nous nous basons donc sur </a:t>
+            </a:r>
+            <a:r>
+              <a:rPr lang="fr-FR" baseline="0" smtClean="0"/>
+              <a:t>le mécanisme de Git.</a:t>
+            </a:r>
             <a:endParaRPr/>
           </a:p>
         </p:txBody>
@@ -1721,7 +1818,7 @@
   <p:cSld>
     <p:spTree>
       <p:nvGrpSpPr>
-        <p:cNvPr id="1" name="Shape 129"/>
+        <p:cNvPr id="1" name="Shape 105"/>
         <p:cNvGrpSpPr/>
         <p:nvPr/>
       </p:nvGrpSpPr>
@@ -1735,7 +1832,7 @@
       </p:grpSpPr>
       <p:sp>
         <p:nvSpPr>
-          <p:cNvPr id="130" name="Shape 130"/>
+          <p:cNvPr id="106" name="Shape 106"/>
           <p:cNvSpPr>
             <a:spLocks noGrp="1" noRot="1" noChangeAspect="1"/>
           </p:cNvSpPr>
@@ -1776,7 +1873,7 @@
       </p:sp>
       <p:sp>
         <p:nvSpPr>
-          <p:cNvPr id="131" name="Shape 131"/>
+          <p:cNvPr id="107" name="Shape 107"/>
           <p:cNvSpPr txBox="1">
             <a:spLocks noGrp="1"/>
           </p:cNvSpPr>
@@ -1822,7 +1919,7 @@
   <p:cSld>
     <p:spTree>
       <p:nvGrpSpPr>
-        <p:cNvPr id="1" name="Shape 141"/>
+        <p:cNvPr id="1" name="Shape 117"/>
         <p:cNvGrpSpPr/>
         <p:nvPr/>
       </p:nvGrpSpPr>
@@ -1836,7 +1933,7 @@
       </p:grpSpPr>
       <p:sp>
         <p:nvSpPr>
-          <p:cNvPr id="142" name="Shape 142"/>
+          <p:cNvPr id="118" name="Shape 118"/>
           <p:cNvSpPr>
             <a:spLocks noGrp="1" noRot="1" noChangeAspect="1"/>
           </p:cNvSpPr>
@@ -1846,8 +1943,8 @@
         </p:nvSpPr>
         <p:spPr>
           <a:xfrm>
-            <a:off x="381187" y="685800"/>
-            <a:ext cx="6096299" cy="3429000"/>
+            <a:off x="381000" y="685800"/>
+            <a:ext cx="6096000" cy="3429000"/>
           </a:xfrm>
           <a:custGeom>
             <a:avLst/>
@@ -1877,7 +1974,7 @@
       </p:sp>
       <p:sp>
         <p:nvSpPr>
-          <p:cNvPr id="143" name="Shape 143"/>
+          <p:cNvPr id="119" name="Shape 119"/>
           <p:cNvSpPr txBox="1">
             <a:spLocks noGrp="1"/>
           </p:cNvSpPr>
@@ -1919,6 +2016,309 @@
 </file>
 
 <file path=ppt/notesSlides/notesSlide22.xml><?xml version="1.0" encoding="utf-8"?>
+<p:notes xmlns:a="http://schemas.openxmlformats.org/drawingml/2006/main" xmlns:r="http://schemas.openxmlformats.org/officeDocument/2006/relationships" xmlns:p="http://schemas.openxmlformats.org/presentationml/2006/main" showMasterSp="0" showMasterPhAnim="0">
+  <p:cSld>
+    <p:spTree>
+      <p:nvGrpSpPr>
+        <p:cNvPr id="1" name="Shape 123"/>
+        <p:cNvGrpSpPr/>
+        <p:nvPr/>
+      </p:nvGrpSpPr>
+      <p:grpSpPr>
+        <a:xfrm>
+          <a:off x="0" y="0"/>
+          <a:ext cx="0" cy="0"/>
+          <a:chOff x="0" y="0"/>
+          <a:chExt cx="0" cy="0"/>
+        </a:xfrm>
+      </p:grpSpPr>
+      <p:sp>
+        <p:nvSpPr>
+          <p:cNvPr id="124" name="Shape 124"/>
+          <p:cNvSpPr>
+            <a:spLocks noGrp="1" noRot="1" noChangeAspect="1"/>
+          </p:cNvSpPr>
+          <p:nvPr>
+            <p:ph type="sldImg" idx="2"/>
+          </p:nvPr>
+        </p:nvSpPr>
+        <p:spPr>
+          <a:xfrm>
+            <a:off x="381000" y="685800"/>
+            <a:ext cx="6096000" cy="3429000"/>
+          </a:xfrm>
+          <a:custGeom>
+            <a:avLst/>
+            <a:gdLst/>
+            <a:ahLst/>
+            <a:cxnLst/>
+            <a:rect l="0" t="0" r="0" b="0"/>
+            <a:pathLst>
+              <a:path w="120000" h="120000" extrusionOk="0">
+                <a:moveTo>
+                  <a:pt x="0" y="0"/>
+                </a:moveTo>
+                <a:lnTo>
+                  <a:pt x="120000" y="0"/>
+                </a:lnTo>
+                <a:lnTo>
+                  <a:pt x="120000" y="120000"/>
+                </a:lnTo>
+                <a:lnTo>
+                  <a:pt x="0" y="120000"/>
+                </a:lnTo>
+                <a:close/>
+              </a:path>
+            </a:pathLst>
+          </a:custGeom>
+        </p:spPr>
+      </p:sp>
+      <p:sp>
+        <p:nvSpPr>
+          <p:cNvPr id="125" name="Shape 125"/>
+          <p:cNvSpPr txBox="1">
+            <a:spLocks noGrp="1"/>
+          </p:cNvSpPr>
+          <p:nvPr>
+            <p:ph type="body" idx="1"/>
+          </p:nvPr>
+        </p:nvSpPr>
+        <p:spPr>
+          <a:xfrm>
+            <a:off x="685800" y="4343400"/>
+            <a:ext cx="5486399" cy="4114800"/>
+          </a:xfrm>
+          <a:prstGeom prst="rect">
+            <a:avLst/>
+          </a:prstGeom>
+        </p:spPr>
+        <p:txBody>
+          <a:bodyPr lIns="91425" tIns="91425" rIns="91425" bIns="91425" anchor="t" anchorCtr="0">
+            <a:noAutofit/>
+          </a:bodyPr>
+          <a:lstStyle/>
+          <a:p>
+            <a:pPr>
+              <a:spcBef>
+                <a:spcPts val="0"/>
+              </a:spcBef>
+              <a:buNone/>
+            </a:pPr>
+            <a:endParaRPr/>
+          </a:p>
+        </p:txBody>
+      </p:sp>
+    </p:spTree>
+  </p:cSld>
+  <p:clrMapOvr>
+    <a:masterClrMapping/>
+  </p:clrMapOvr>
+</p:notes>
+</file>
+
+<file path=ppt/notesSlides/notesSlide23.xml><?xml version="1.0" encoding="utf-8"?>
+<p:notes xmlns:a="http://schemas.openxmlformats.org/drawingml/2006/main" xmlns:r="http://schemas.openxmlformats.org/officeDocument/2006/relationships" xmlns:p="http://schemas.openxmlformats.org/presentationml/2006/main" showMasterSp="0" showMasterPhAnim="0">
+  <p:cSld>
+    <p:spTree>
+      <p:nvGrpSpPr>
+        <p:cNvPr id="1" name="Shape 129"/>
+        <p:cNvGrpSpPr/>
+        <p:nvPr/>
+      </p:nvGrpSpPr>
+      <p:grpSpPr>
+        <a:xfrm>
+          <a:off x="0" y="0"/>
+          <a:ext cx="0" cy="0"/>
+          <a:chOff x="0" y="0"/>
+          <a:chExt cx="0" cy="0"/>
+        </a:xfrm>
+      </p:grpSpPr>
+      <p:sp>
+        <p:nvSpPr>
+          <p:cNvPr id="130" name="Shape 130"/>
+          <p:cNvSpPr>
+            <a:spLocks noGrp="1" noRot="1" noChangeAspect="1"/>
+          </p:cNvSpPr>
+          <p:nvPr>
+            <p:ph type="sldImg" idx="2"/>
+          </p:nvPr>
+        </p:nvSpPr>
+        <p:spPr>
+          <a:xfrm>
+            <a:off x="381000" y="685800"/>
+            <a:ext cx="6096000" cy="3429000"/>
+          </a:xfrm>
+          <a:custGeom>
+            <a:avLst/>
+            <a:gdLst/>
+            <a:ahLst/>
+            <a:cxnLst/>
+            <a:rect l="0" t="0" r="0" b="0"/>
+            <a:pathLst>
+              <a:path w="120000" h="120000" extrusionOk="0">
+                <a:moveTo>
+                  <a:pt x="0" y="0"/>
+                </a:moveTo>
+                <a:lnTo>
+                  <a:pt x="120000" y="0"/>
+                </a:lnTo>
+                <a:lnTo>
+                  <a:pt x="120000" y="120000"/>
+                </a:lnTo>
+                <a:lnTo>
+                  <a:pt x="0" y="120000"/>
+                </a:lnTo>
+                <a:close/>
+              </a:path>
+            </a:pathLst>
+          </a:custGeom>
+        </p:spPr>
+      </p:sp>
+      <p:sp>
+        <p:nvSpPr>
+          <p:cNvPr id="131" name="Shape 131"/>
+          <p:cNvSpPr txBox="1">
+            <a:spLocks noGrp="1"/>
+          </p:cNvSpPr>
+          <p:nvPr>
+            <p:ph type="body" idx="1"/>
+          </p:nvPr>
+        </p:nvSpPr>
+        <p:spPr>
+          <a:xfrm>
+            <a:off x="685800" y="4343400"/>
+            <a:ext cx="5486399" cy="4114800"/>
+          </a:xfrm>
+          <a:prstGeom prst="rect">
+            <a:avLst/>
+          </a:prstGeom>
+        </p:spPr>
+        <p:txBody>
+          <a:bodyPr lIns="91425" tIns="91425" rIns="91425" bIns="91425" anchor="t" anchorCtr="0">
+            <a:noAutofit/>
+          </a:bodyPr>
+          <a:lstStyle/>
+          <a:p>
+            <a:pPr>
+              <a:spcBef>
+                <a:spcPts val="0"/>
+              </a:spcBef>
+              <a:buNone/>
+            </a:pPr>
+            <a:endParaRPr/>
+          </a:p>
+        </p:txBody>
+      </p:sp>
+    </p:spTree>
+  </p:cSld>
+  <p:clrMapOvr>
+    <a:masterClrMapping/>
+  </p:clrMapOvr>
+</p:notes>
+</file>
+
+<file path=ppt/notesSlides/notesSlide24.xml><?xml version="1.0" encoding="utf-8"?>
+<p:notes xmlns:a="http://schemas.openxmlformats.org/drawingml/2006/main" xmlns:r="http://schemas.openxmlformats.org/officeDocument/2006/relationships" xmlns:p="http://schemas.openxmlformats.org/presentationml/2006/main" showMasterSp="0" showMasterPhAnim="0">
+  <p:cSld>
+    <p:spTree>
+      <p:nvGrpSpPr>
+        <p:cNvPr id="1" name="Shape 141"/>
+        <p:cNvGrpSpPr/>
+        <p:nvPr/>
+      </p:nvGrpSpPr>
+      <p:grpSpPr>
+        <a:xfrm>
+          <a:off x="0" y="0"/>
+          <a:ext cx="0" cy="0"/>
+          <a:chOff x="0" y="0"/>
+          <a:chExt cx="0" cy="0"/>
+        </a:xfrm>
+      </p:grpSpPr>
+      <p:sp>
+        <p:nvSpPr>
+          <p:cNvPr id="142" name="Shape 142"/>
+          <p:cNvSpPr>
+            <a:spLocks noGrp="1" noRot="1" noChangeAspect="1"/>
+          </p:cNvSpPr>
+          <p:nvPr>
+            <p:ph type="sldImg" idx="2"/>
+          </p:nvPr>
+        </p:nvSpPr>
+        <p:spPr>
+          <a:xfrm>
+            <a:off x="381187" y="685800"/>
+            <a:ext cx="6096299" cy="3429000"/>
+          </a:xfrm>
+          <a:custGeom>
+            <a:avLst/>
+            <a:gdLst/>
+            <a:ahLst/>
+            <a:cxnLst/>
+            <a:rect l="0" t="0" r="0" b="0"/>
+            <a:pathLst>
+              <a:path w="120000" h="120000" extrusionOk="0">
+                <a:moveTo>
+                  <a:pt x="0" y="0"/>
+                </a:moveTo>
+                <a:lnTo>
+                  <a:pt x="120000" y="0"/>
+                </a:lnTo>
+                <a:lnTo>
+                  <a:pt x="120000" y="120000"/>
+                </a:lnTo>
+                <a:lnTo>
+                  <a:pt x="0" y="120000"/>
+                </a:lnTo>
+                <a:close/>
+              </a:path>
+            </a:pathLst>
+          </a:custGeom>
+        </p:spPr>
+      </p:sp>
+      <p:sp>
+        <p:nvSpPr>
+          <p:cNvPr id="143" name="Shape 143"/>
+          <p:cNvSpPr txBox="1">
+            <a:spLocks noGrp="1"/>
+          </p:cNvSpPr>
+          <p:nvPr>
+            <p:ph type="body" idx="1"/>
+          </p:nvPr>
+        </p:nvSpPr>
+        <p:spPr>
+          <a:xfrm>
+            <a:off x="685800" y="4343400"/>
+            <a:ext cx="5486399" cy="4114800"/>
+          </a:xfrm>
+          <a:prstGeom prst="rect">
+            <a:avLst/>
+          </a:prstGeom>
+        </p:spPr>
+        <p:txBody>
+          <a:bodyPr lIns="91425" tIns="91425" rIns="91425" bIns="91425" anchor="t" anchorCtr="0">
+            <a:noAutofit/>
+          </a:bodyPr>
+          <a:lstStyle/>
+          <a:p>
+            <a:pPr>
+              <a:spcBef>
+                <a:spcPts val="0"/>
+              </a:spcBef>
+              <a:buNone/>
+            </a:pPr>
+            <a:endParaRPr/>
+          </a:p>
+        </p:txBody>
+      </p:sp>
+    </p:spTree>
+  </p:cSld>
+  <p:clrMapOvr>
+    <a:masterClrMapping/>
+  </p:clrMapOvr>
+</p:notes>
+</file>
+
+<file path=ppt/notesSlides/notesSlide25.xml><?xml version="1.0" encoding="utf-8"?>
 <p:notes xmlns:a="http://schemas.openxmlformats.org/drawingml/2006/main" xmlns:r="http://schemas.openxmlformats.org/officeDocument/2006/relationships" xmlns:p="http://schemas.openxmlformats.org/presentationml/2006/main" showMasterSp="0" showMasterPhAnim="0">
   <p:cSld>
     <p:spTree>
@@ -2082,15 +2482,15 @@
             </a:r>
             <a:r>
               <a:rPr lang="fr-FR" baseline="0" dirty="0" smtClean="0"/>
-              <a:t>, git) années 2000. Ces travaux analysent l’historique de construction d’un logiciel. </a:t>
-            </a:r>
-            <a:r>
-              <a:rPr lang="fr-FR" baseline="0" smtClean="0"/>
-              <a:t>Exemple , un </a:t>
+              <a:t>, git) années 2000. </a:t>
             </a:r>
             <a:r>
               <a:rPr lang="fr-FR" baseline="0" dirty="0" smtClean="0"/>
-              <a:t>défi du génie log, prédiction de bugs. Son but, prédire les bugs et les localiser. Cette étude se base sur le calcul de métriques logicielles. Les travaux les plus </a:t>
+              <a:t>Des </a:t>
+            </a:r>
+            <a:r>
+              <a:rPr lang="fr-FR" baseline="0" dirty="0" smtClean="0"/>
+              <a:t>travaux analysent l’historique de construction d’un logiciel. Exemple , un défi du génie log, prédiction de bugs. Son but, prédire les bugs et les localiser. Cette étude se base sur le calcul de métriques logicielles. Les travaux les plus </a:t>
             </a:r>
             <a:r>
               <a:rPr lang="fr-FR" baseline="0" dirty="0" err="1" smtClean="0"/>
@@ -2200,19 +2600,98 @@
           </a:bodyPr>
           <a:lstStyle/>
           <a:p>
-            <a:pPr>
-              <a:spcBef>
-                <a:spcPts val="0"/>
-              </a:spcBef>
-              <a:buNone/>
-            </a:pPr>
             <a:r>
               <a:rPr lang="fr-FR" dirty="0" smtClean="0"/>
-              <a:t>Les métriques de procédés se concentrent</a:t>
+              <a:t>Pour comprendre les </a:t>
+            </a:r>
+            <a:r>
+              <a:rPr lang="fr-FR" dirty="0" smtClean="0"/>
+              <a:t>métriques de procédés se concentrent</a:t>
             </a:r>
             <a:r>
               <a:rPr lang="fr-FR" baseline="0" dirty="0" smtClean="0"/>
-              <a:t> sur l’évolution logicielle et mesurent les modifications subies par les entités d’un code source durant le développement.</a:t>
+              <a:t> sur l’évolution logicielle et mesurent les modifications subies par les entités d’un code source durant le développement</a:t>
+            </a:r>
+            <a:r>
+              <a:rPr lang="fr-FR" baseline="0" dirty="0" smtClean="0"/>
+              <a:t>. </a:t>
+            </a:r>
+            <a:r>
+              <a:rPr lang="fr-FR" sz="1100" b="0" i="0" u="none" strike="noStrike" kern="1200" baseline="0" dirty="0" smtClean="0">
+                <a:solidFill>
+                  <a:schemeClr val="tx1"/>
+                </a:solidFill>
+                <a:latin typeface="+mn-lt"/>
+                <a:ea typeface="+mn-ea"/>
+                <a:cs typeface="+mn-cs"/>
+              </a:rPr>
+              <a:t>Le nombre de développeurs qui ont contribués au développement d’une (</a:t>
+            </a:r>
+            <a:r>
+              <a:rPr lang="fr-FR" sz="1100" b="0" i="0" u="none" strike="noStrike" kern="1200" baseline="0" dirty="0" err="1" smtClean="0">
+                <a:solidFill>
+                  <a:schemeClr val="tx1"/>
+                </a:solidFill>
+                <a:latin typeface="+mn-lt"/>
+                <a:ea typeface="+mn-ea"/>
+                <a:cs typeface="+mn-cs"/>
+              </a:rPr>
+              <a:t>NoD</a:t>
+            </a:r>
+            <a:r>
+              <a:rPr lang="fr-FR" sz="1100" b="0" i="0" u="none" strike="noStrike" kern="1200" baseline="0" dirty="0" smtClean="0">
+                <a:solidFill>
+                  <a:schemeClr val="tx1"/>
+                </a:solidFill>
+                <a:latin typeface="+mn-lt"/>
+                <a:ea typeface="+mn-ea"/>
+                <a:cs typeface="+mn-cs"/>
+              </a:rPr>
+              <a:t>), le nombre de modifications subies par une entité (</a:t>
+            </a:r>
+            <a:r>
+              <a:rPr lang="fr-FR" sz="1100" b="0" i="0" u="none" strike="noStrike" kern="1200" baseline="0" dirty="0" err="1" smtClean="0">
+                <a:solidFill>
+                  <a:schemeClr val="tx1"/>
+                </a:solidFill>
+                <a:latin typeface="+mn-lt"/>
+                <a:ea typeface="+mn-ea"/>
+                <a:cs typeface="+mn-cs"/>
+              </a:rPr>
+              <a:t>NoC</a:t>
+            </a:r>
+            <a:r>
+              <a:rPr lang="fr-FR" sz="1100" b="0" i="0" u="none" strike="noStrike" kern="1200" baseline="0" dirty="0" smtClean="0">
+                <a:solidFill>
+                  <a:schemeClr val="tx1"/>
+                </a:solidFill>
+                <a:latin typeface="+mn-lt"/>
+                <a:ea typeface="+mn-ea"/>
+                <a:cs typeface="+mn-cs"/>
+              </a:rPr>
+              <a:t>) et le Code </a:t>
+            </a:r>
+            <a:r>
+              <a:rPr lang="fr-FR" sz="1100" b="0" i="0" u="none" strike="noStrike" kern="1200" baseline="0" dirty="0" err="1" smtClean="0">
+                <a:solidFill>
+                  <a:schemeClr val="tx1"/>
+                </a:solidFill>
+                <a:latin typeface="+mn-lt"/>
+                <a:ea typeface="+mn-ea"/>
+                <a:cs typeface="+mn-cs"/>
+              </a:rPr>
+              <a:t>Churn</a:t>
+            </a:r>
+            <a:r>
+              <a:rPr lang="fr-FR" sz="1100" b="0" i="0" u="none" strike="noStrike" kern="1200" baseline="0" dirty="0" smtClean="0">
+                <a:solidFill>
+                  <a:schemeClr val="tx1"/>
+                </a:solidFill>
+                <a:latin typeface="+mn-lt"/>
+                <a:ea typeface="+mn-ea"/>
+                <a:cs typeface="+mn-cs"/>
+              </a:rPr>
+              <a:t> correspond au nombre de lignes de code qui ont été ajoutées ou supprimées à une entité. (entité fichier fonctions…)</a:t>
             </a:r>
             <a:endParaRPr dirty="0"/>
           </a:p>
@@ -2227,6 +2706,105 @@
 </file>
 
 <file path=ppt/notesSlides/notesSlide5.xml><?xml version="1.0" encoding="utf-8"?>
+<p:notes xmlns:a="http://schemas.openxmlformats.org/drawingml/2006/main" xmlns:r="http://schemas.openxmlformats.org/officeDocument/2006/relationships" xmlns:p="http://schemas.openxmlformats.org/presentationml/2006/main">
+  <p:cSld>
+    <p:spTree>
+      <p:nvGrpSpPr>
+        <p:cNvPr id="1" name=""/>
+        <p:cNvGrpSpPr/>
+        <p:nvPr/>
+      </p:nvGrpSpPr>
+      <p:grpSpPr>
+        <a:xfrm>
+          <a:off x="0" y="0"/>
+          <a:ext cx="0" cy="0"/>
+          <a:chOff x="0" y="0"/>
+          <a:chExt cx="0" cy="0"/>
+        </a:xfrm>
+      </p:grpSpPr>
+      <p:sp>
+        <p:nvSpPr>
+          <p:cNvPr id="2" name="Slide Image Placeholder 1"/>
+          <p:cNvSpPr>
+            <a:spLocks noGrp="1" noRot="1" noChangeAspect="1"/>
+          </p:cNvSpPr>
+          <p:nvPr>
+            <p:ph type="sldImg"/>
+          </p:nvPr>
+        </p:nvSpPr>
+        <p:spPr>
+          <a:xfrm>
+            <a:off x="381000" y="685800"/>
+            <a:ext cx="6096000" cy="3429000"/>
+          </a:xfrm>
+        </p:spPr>
+      </p:sp>
+      <p:sp>
+        <p:nvSpPr>
+          <p:cNvPr id="3" name="Notes Placeholder 2"/>
+          <p:cNvSpPr>
+            <a:spLocks noGrp="1"/>
+          </p:cNvSpPr>
+          <p:nvPr>
+            <p:ph type="body" idx="1"/>
+          </p:nvPr>
+        </p:nvSpPr>
+        <p:spPr/>
+        <p:txBody>
+          <a:bodyPr/>
+          <a:lstStyle/>
+          <a:p>
+            <a:r>
+              <a:rPr lang="fr-FR" sz="1100" b="0" i="0" u="none" strike="noStrike" kern="1200" baseline="0" dirty="0" smtClean="0">
+                <a:solidFill>
+                  <a:schemeClr val="tx1"/>
+                </a:solidFill>
+                <a:latin typeface="+mn-lt"/>
+                <a:ea typeface="+mn-ea"/>
+                <a:cs typeface="+mn-cs"/>
+              </a:rPr>
+              <a:t>Les VCS nous permettent de calculer ces métriques. Car </a:t>
+            </a:r>
+            <a:r>
+              <a:rPr lang="fr-FR" sz="1100" b="0" i="0" u="none" strike="noStrike" kern="1200" baseline="0" dirty="0" err="1" smtClean="0">
+                <a:solidFill>
+                  <a:schemeClr val="tx1"/>
+                </a:solidFill>
+                <a:latin typeface="+mn-lt"/>
+                <a:ea typeface="+mn-ea"/>
+                <a:cs typeface="+mn-cs"/>
+              </a:rPr>
+              <a:t>grace</a:t>
+            </a:r>
+            <a:r>
+              <a:rPr lang="fr-FR" sz="1100" b="0" i="0" u="none" strike="noStrike" kern="1200" baseline="0" dirty="0" smtClean="0">
+                <a:solidFill>
+                  <a:schemeClr val="tx1"/>
+                </a:solidFill>
+                <a:latin typeface="+mn-lt"/>
+                <a:ea typeface="+mn-ea"/>
+                <a:cs typeface="+mn-cs"/>
+              </a:rPr>
+              <a:t> à un système d’historique, il garde en mémoire chaque versions établis lors de l’évolution du logiciel et leur contenus. Il est donc possible d’observer chaque entité modifiée lors d’une période puis de garder uniquement les entités toujours présentes à la dernière version de notre période. </a:t>
+            </a:r>
+            <a:endParaRPr lang="fr-FR" dirty="0"/>
+          </a:p>
+        </p:txBody>
+      </p:sp>
+    </p:spTree>
+    <p:extLst>
+      <p:ext uri="{BB962C8B-B14F-4D97-AF65-F5344CB8AC3E}">
+        <p14:creationId xmlns:p14="http://schemas.microsoft.com/office/powerpoint/2010/main" val="625440417"/>
+      </p:ext>
+    </p:extLst>
+  </p:cSld>
+  <p:clrMapOvr>
+    <a:masterClrMapping/>
+  </p:clrMapOvr>
+</p:notes>
+</file>
+
+<file path=ppt/notesSlides/notesSlide6.xml><?xml version="1.0" encoding="utf-8"?>
 <p:notes xmlns:a="http://schemas.openxmlformats.org/drawingml/2006/main" xmlns:r="http://schemas.openxmlformats.org/officeDocument/2006/relationships" xmlns:p="http://schemas.openxmlformats.org/presentationml/2006/main" showMasterSp="0" showMasterPhAnim="0">
   <p:cSld>
     <p:spTree>
@@ -2315,7 +2893,23 @@
               </a:spcBef>
               <a:buNone/>
             </a:pPr>
-            <a:endParaRPr/>
+            <a:r>
+              <a:rPr lang="fr-FR" dirty="0" smtClean="0"/>
+              <a:t>Or, une entité de code peut être renommée au cours de son histoire. Ici un exemple, les entités sont au</a:t>
+            </a:r>
+            <a:r>
+              <a:rPr lang="fr-FR" baseline="0" dirty="0" smtClean="0"/>
+              <a:t> niveau fichier, nous observons l’historique d’un logiciel , 3 versions consécutives avec les </a:t>
+            </a:r>
+            <a:r>
+              <a:rPr lang="fr-FR" baseline="0" dirty="0" err="1" smtClean="0"/>
+              <a:t>dév</a:t>
+            </a:r>
+            <a:r>
+              <a:rPr lang="fr-FR" baseline="0" dirty="0" smtClean="0"/>
+              <a:t>. Le contenu du projet à chaque versions, on remarque que dans la version trois, le fichier est renommé et un commentaire est ajouté.</a:t>
+            </a:r>
+            <a:endParaRPr dirty="0"/>
           </a:p>
         </p:txBody>
       </p:sp>
@@ -2327,12 +2921,12 @@
 </p:notes>
 </file>
 
-<file path=ppt/notesSlides/notesSlide6.xml><?xml version="1.0" encoding="utf-8"?>
+<file path=ppt/notesSlides/notesSlide7.xml><?xml version="1.0" encoding="utf-8"?>
 <p:notes xmlns:a="http://schemas.openxmlformats.org/drawingml/2006/main" xmlns:r="http://schemas.openxmlformats.org/officeDocument/2006/relationships" xmlns:p="http://schemas.openxmlformats.org/presentationml/2006/main" showMasterSp="0" showMasterPhAnim="0">
   <p:cSld>
     <p:spTree>
       <p:nvGrpSpPr>
-        <p:cNvPr id="1" name="Shape 56"/>
+        <p:cNvPr id="1" name="Shape 47"/>
         <p:cNvGrpSpPr/>
         <p:nvPr/>
       </p:nvGrpSpPr>
@@ -2346,7 +2940,7 @@
       </p:grpSpPr>
       <p:sp>
         <p:nvSpPr>
-          <p:cNvPr id="57" name="Shape 57"/>
+          <p:cNvPr id="48" name="Shape 48"/>
           <p:cNvSpPr>
             <a:spLocks noGrp="1" noRot="1" noChangeAspect="1"/>
           </p:cNvSpPr>
@@ -2387,7 +2981,7 @@
       </p:sp>
       <p:sp>
         <p:nvSpPr>
-          <p:cNvPr id="58" name="Shape 58"/>
+          <p:cNvPr id="49" name="Shape 49"/>
           <p:cNvSpPr txBox="1">
             <a:spLocks noGrp="1"/>
           </p:cNvSpPr>
@@ -2416,7 +3010,47 @@
               </a:spcBef>
               <a:buNone/>
             </a:pPr>
-            <a:endParaRPr/>
+            <a:r>
+              <a:rPr lang="fr-FR" dirty="0" smtClean="0"/>
+              <a:t>On regarde le déroulement du</a:t>
+            </a:r>
+            <a:r>
+              <a:rPr lang="fr-FR" baseline="0" dirty="0" smtClean="0"/>
+              <a:t> </a:t>
+            </a:r>
+            <a:r>
+              <a:rPr lang="fr-FR" dirty="0" smtClean="0"/>
+              <a:t>calcul d’une métrique, </a:t>
+            </a:r>
+            <a:r>
+              <a:rPr lang="fr-FR" dirty="0" err="1" smtClean="0"/>
+              <a:t>NoD</a:t>
+            </a:r>
+            <a:r>
+              <a:rPr lang="fr-FR" dirty="0" smtClean="0"/>
+              <a:t>. Dans</a:t>
+            </a:r>
+            <a:r>
+              <a:rPr lang="fr-FR" baseline="0" dirty="0" smtClean="0"/>
+              <a:t> le cadre de la prédiction de bug, le but étant de détecter les bugs dans la prochaine version, on ne regarde que les entités présente à la fin de notre période (vers1 à 3). Dans les VCS, une entité est identité par son chemin absolue. (racine dossier + fichier) On prend donc alors la seule entité présente, </a:t>
+            </a:r>
+            <a:r>
+              <a:rPr lang="fr-FR" baseline="0" dirty="0" err="1" smtClean="0"/>
+              <a:t>Hello.php</a:t>
+            </a:r>
+            <a:r>
+              <a:rPr lang="fr-FR" baseline="0" dirty="0" smtClean="0"/>
+              <a:t>. Son </a:t>
+            </a:r>
+            <a:r>
+              <a:rPr lang="fr-FR" baseline="0" dirty="0" err="1" smtClean="0"/>
+              <a:t>NoD</a:t>
+            </a:r>
+            <a:r>
+              <a:rPr lang="fr-FR" baseline="0" dirty="0" smtClean="0"/>
+              <a:t> =1.</a:t>
+            </a:r>
+            <a:endParaRPr dirty="0"/>
           </a:p>
         </p:txBody>
       </p:sp>
@@ -2428,12 +3062,12 @@
 </p:notes>
 </file>
 
-<file path=ppt/notesSlides/notesSlide7.xml><?xml version="1.0" encoding="utf-8"?>
+<file path=ppt/notesSlides/notesSlide8.xml><?xml version="1.0" encoding="utf-8"?>
 <p:notes xmlns:a="http://schemas.openxmlformats.org/drawingml/2006/main" xmlns:r="http://schemas.openxmlformats.org/officeDocument/2006/relationships" xmlns:p="http://schemas.openxmlformats.org/presentationml/2006/main" showMasterSp="0" showMasterPhAnim="0">
   <p:cSld>
     <p:spTree>
       <p:nvGrpSpPr>
-        <p:cNvPr id="1" name="Shape 62"/>
+        <p:cNvPr id="1" name="Shape 56"/>
         <p:cNvGrpSpPr/>
         <p:nvPr/>
       </p:nvGrpSpPr>
@@ -2447,7 +3081,7 @@
       </p:grpSpPr>
       <p:sp>
         <p:nvSpPr>
-          <p:cNvPr id="63" name="Shape 63"/>
+          <p:cNvPr id="57" name="Shape 57"/>
           <p:cNvSpPr>
             <a:spLocks noGrp="1" noRot="1" noChangeAspect="1"/>
           </p:cNvSpPr>
@@ -2488,7 +3122,7 @@
       </p:sp>
       <p:sp>
         <p:nvSpPr>
-          <p:cNvPr id="64" name="Shape 64"/>
+          <p:cNvPr id="58" name="Shape 58"/>
           <p:cNvSpPr txBox="1">
             <a:spLocks noGrp="1"/>
           </p:cNvSpPr>
@@ -2511,13 +3145,39 @@
           </a:bodyPr>
           <a:lstStyle/>
           <a:p>
-            <a:pPr>
-              <a:spcBef>
-                <a:spcPts val="0"/>
-              </a:spcBef>
-              <a:buNone/>
-            </a:pPr>
-            <a:endParaRPr/>
+            <a:r>
+              <a:rPr lang="fr-FR" dirty="0" smtClean="0"/>
+              <a:t>Or</a:t>
+            </a:r>
+            <a:r>
+              <a:rPr lang="fr-FR" baseline="0" dirty="0" smtClean="0"/>
+              <a:t> en prenant en compte le renommage, on sait que </a:t>
+            </a:r>
+            <a:r>
+              <a:rPr lang="fr-FR" baseline="0" dirty="0" err="1" smtClean="0"/>
+              <a:t>Test.php</a:t>
+            </a:r>
+            <a:r>
+              <a:rPr lang="fr-FR" baseline="0" dirty="0" smtClean="0"/>
+              <a:t> est devenue </a:t>
+            </a:r>
+            <a:r>
+              <a:rPr lang="fr-FR" baseline="0" dirty="0" err="1" smtClean="0"/>
+              <a:t>Hello.php</a:t>
+            </a:r>
+            <a:r>
+              <a:rPr lang="fr-FR" baseline="0" dirty="0" smtClean="0"/>
+              <a:t> à la version trois. Donc </a:t>
+            </a:r>
+            <a:r>
+              <a:rPr lang="fr-FR" baseline="0" dirty="0" err="1" smtClean="0"/>
+              <a:t>NoD</a:t>
+            </a:r>
+            <a:r>
+              <a:rPr lang="fr-FR" baseline="0" dirty="0" smtClean="0"/>
+              <a:t> = 3.  </a:t>
+            </a:r>
+            <a:endParaRPr dirty="0"/>
           </a:p>
         </p:txBody>
       </p:sp>
@@ -2529,12 +3189,12 @@
 </p:notes>
 </file>
 
-<file path=ppt/notesSlides/notesSlide8.xml><?xml version="1.0" encoding="utf-8"?>
+<file path=ppt/notesSlides/notesSlide9.xml><?xml version="1.0" encoding="utf-8"?>
 <p:notes xmlns:a="http://schemas.openxmlformats.org/drawingml/2006/main" xmlns:r="http://schemas.openxmlformats.org/officeDocument/2006/relationships" xmlns:p="http://schemas.openxmlformats.org/presentationml/2006/main" showMasterSp="0" showMasterPhAnim="0">
   <p:cSld>
     <p:spTree>
       <p:nvGrpSpPr>
-        <p:cNvPr id="1" name="Shape 68"/>
+        <p:cNvPr id="1" name="Shape 62"/>
         <p:cNvGrpSpPr/>
         <p:nvPr/>
       </p:nvGrpSpPr>
@@ -2548,7 +3208,7 @@
       </p:grpSpPr>
       <p:sp>
         <p:nvSpPr>
-          <p:cNvPr id="69" name="Shape 69"/>
+          <p:cNvPr id="63" name="Shape 63"/>
           <p:cNvSpPr>
             <a:spLocks noGrp="1" noRot="1" noChangeAspect="1"/>
           </p:cNvSpPr>
@@ -2589,7 +3249,7 @@
       </p:sp>
       <p:sp>
         <p:nvSpPr>
-          <p:cNvPr id="70" name="Shape 70"/>
+          <p:cNvPr id="64" name="Shape 64"/>
           <p:cNvSpPr txBox="1">
             <a:spLocks noGrp="1"/>
           </p:cNvSpPr>
@@ -2618,108 +3278,71 @@
               </a:spcBef>
               <a:buNone/>
             </a:pPr>
-            <a:endParaRPr/>
-          </a:p>
-        </p:txBody>
-      </p:sp>
-    </p:spTree>
-  </p:cSld>
-  <p:clrMapOvr>
-    <a:masterClrMapping/>
-  </p:clrMapOvr>
-</p:notes>
-</file>
-
-<file path=ppt/notesSlides/notesSlide9.xml><?xml version="1.0" encoding="utf-8"?>
-<p:notes xmlns:a="http://schemas.openxmlformats.org/drawingml/2006/main" xmlns:r="http://schemas.openxmlformats.org/officeDocument/2006/relationships" xmlns:p="http://schemas.openxmlformats.org/presentationml/2006/main" showMasterSp="0" showMasterPhAnim="0">
-  <p:cSld>
-    <p:spTree>
-      <p:nvGrpSpPr>
-        <p:cNvPr id="1" name="Shape 74"/>
-        <p:cNvGrpSpPr/>
-        <p:nvPr/>
-      </p:nvGrpSpPr>
-      <p:grpSpPr>
-        <a:xfrm>
-          <a:off x="0" y="0"/>
-          <a:ext cx="0" cy="0"/>
-          <a:chOff x="0" y="0"/>
-          <a:chExt cx="0" cy="0"/>
-        </a:xfrm>
-      </p:grpSpPr>
-      <p:sp>
-        <p:nvSpPr>
-          <p:cNvPr id="75" name="Shape 75"/>
-          <p:cNvSpPr>
-            <a:spLocks noGrp="1" noRot="1" noChangeAspect="1"/>
-          </p:cNvSpPr>
-          <p:nvPr>
-            <p:ph type="sldImg" idx="2"/>
-          </p:nvPr>
-        </p:nvSpPr>
-        <p:spPr>
-          <a:xfrm>
-            <a:off x="381000" y="685800"/>
-            <a:ext cx="6096000" cy="3429000"/>
-          </a:xfrm>
-          <a:custGeom>
-            <a:avLst/>
-            <a:gdLst/>
-            <a:ahLst/>
-            <a:cxnLst/>
-            <a:rect l="0" t="0" r="0" b="0"/>
-            <a:pathLst>
-              <a:path w="120000" h="120000" extrusionOk="0">
-                <a:moveTo>
-                  <a:pt x="0" y="0"/>
-                </a:moveTo>
-                <a:lnTo>
-                  <a:pt x="120000" y="0"/>
-                </a:lnTo>
-                <a:lnTo>
-                  <a:pt x="120000" y="120000"/>
-                </a:lnTo>
-                <a:lnTo>
-                  <a:pt x="0" y="120000"/>
-                </a:lnTo>
-                <a:close/>
-              </a:path>
-            </a:pathLst>
-          </a:custGeom>
-        </p:spPr>
-      </p:sp>
-      <p:sp>
-        <p:nvSpPr>
-          <p:cNvPr id="76" name="Shape 76"/>
-          <p:cNvSpPr txBox="1">
-            <a:spLocks noGrp="1"/>
-          </p:cNvSpPr>
-          <p:nvPr>
-            <p:ph type="body" idx="1"/>
-          </p:nvPr>
-        </p:nvSpPr>
-        <p:spPr>
-          <a:xfrm>
-            <a:off x="685800" y="4343400"/>
-            <a:ext cx="5486399" cy="4114800"/>
-          </a:xfrm>
-          <a:prstGeom prst="rect">
-            <a:avLst/>
-          </a:prstGeom>
-        </p:spPr>
-        <p:txBody>
-          <a:bodyPr lIns="91425" tIns="91425" rIns="91425" bIns="91425" anchor="t" anchorCtr="0">
-            <a:noAutofit/>
-          </a:bodyPr>
-          <a:lstStyle/>
-          <a:p>
-            <a:pPr>
-              <a:spcBef>
-                <a:spcPts val="0"/>
-              </a:spcBef>
-              <a:buNone/>
-            </a:pPr>
-            <a:endParaRPr/>
+            <a:r>
+              <a:rPr lang="fr-FR" dirty="0" smtClean="0"/>
+              <a:t>CVS ne gère pas du tout les renommage, SVN</a:t>
+            </a:r>
+            <a:r>
+              <a:rPr lang="fr-FR" baseline="0" dirty="0" smtClean="0"/>
+              <a:t> et </a:t>
+            </a:r>
+            <a:r>
+              <a:rPr lang="fr-FR" baseline="0" dirty="0" err="1" smtClean="0"/>
+              <a:t>Mercurial</a:t>
+            </a:r>
+            <a:r>
+              <a:rPr lang="fr-FR" baseline="0" dirty="0" smtClean="0"/>
+              <a:t> sont manuel, c’est-à-dire qu’une commande spécifique à l’outil doit être utilisé pour préciser lorsqu’on renomme un fichier et Git </a:t>
+            </a:r>
+            <a:r>
+              <a:rPr lang="fr-FR" baseline="0" dirty="0" err="1" smtClean="0"/>
+              <a:t>automatque</a:t>
+            </a:r>
+            <a:r>
+              <a:rPr lang="fr-FR" baseline="0" dirty="0" smtClean="0"/>
+              <a:t> mais optionnel, détecte les renommages automatiquement, mais une option à activer lorsqu’on parcours l’historique pour afficher les renommages de fichiers. Ces VCS fonctionne à un niveau de granularité fichier. Une étude de Kim et al montre que les </a:t>
+            </a:r>
+            <a:r>
+              <a:rPr lang="fr-FR" baseline="0" dirty="0" err="1" smtClean="0"/>
+              <a:t>dev</a:t>
+            </a:r>
+            <a:r>
+              <a:rPr lang="fr-FR" baseline="0" dirty="0" smtClean="0"/>
+              <a:t> n’</a:t>
+            </a:r>
+            <a:r>
+              <a:rPr lang="fr-FR" baseline="0" dirty="0" err="1" smtClean="0"/>
+              <a:t>utlisent</a:t>
+            </a:r>
+            <a:r>
+              <a:rPr lang="fr-FR" baseline="0" dirty="0" smtClean="0"/>
+              <a:t> pas les commandes fournit pour faire leur renommage, que 51% des </a:t>
+            </a:r>
+            <a:r>
+              <a:rPr lang="fr-FR" baseline="0" dirty="0" err="1" smtClean="0"/>
+              <a:t>refactorings</a:t>
+            </a:r>
+            <a:r>
+              <a:rPr lang="fr-FR" baseline="0" dirty="0" smtClean="0"/>
+              <a:t> n’utilisent pas du tout les commandes. Nous ne pouvons donc pas nous baser sur ces outils pour notre étude, </a:t>
+            </a:r>
+            <a:r>
+              <a:rPr lang="fr-FR" baseline="0" dirty="0" err="1" smtClean="0"/>
+              <a:t>daurénavent</a:t>
+            </a:r>
+            <a:r>
+              <a:rPr lang="fr-FR" baseline="0" dirty="0" smtClean="0"/>
+              <a:t> nous utiliserons Git comme </a:t>
+            </a:r>
+            <a:r>
+              <a:rPr lang="fr-FR" baseline="0" dirty="0" err="1" smtClean="0"/>
+              <a:t>vcs</a:t>
+            </a:r>
+            <a:r>
+              <a:rPr lang="fr-FR" baseline="0" dirty="0" smtClean="0"/>
+              <a:t> de référence.</a:t>
+            </a:r>
+            <a:endParaRPr dirty="0"/>
           </a:p>
         </p:txBody>
       </p:sp>
@@ -4754,7 +5377,7 @@
   <p:cSld>
     <p:spTree>
       <p:nvGrpSpPr>
-        <p:cNvPr id="1" name="Shape 77"/>
+        <p:cNvPr id="1" name="Shape 65"/>
         <p:cNvGrpSpPr/>
         <p:nvPr/>
       </p:nvGrpSpPr>
@@ -4768,7 +5391,7 @@
       </p:grpSpPr>
       <p:sp>
         <p:nvSpPr>
-          <p:cNvPr id="78" name="Shape 78"/>
+          <p:cNvPr id="66" name="Shape 66"/>
           <p:cNvSpPr txBox="1">
             <a:spLocks noGrp="1"/>
           </p:cNvSpPr>
@@ -4791,8 +5414,14 @@
           </a:bodyPr>
           <a:lstStyle/>
           <a:p>
-            <a:r>
-              <a:rPr lang="fr" dirty="0"/>
+            <a:pPr lvl="0" rtl="0">
+              <a:spcBef>
+                <a:spcPts val="0"/>
+              </a:spcBef>
+              <a:buNone/>
+            </a:pPr>
+            <a:r>
+              <a:rPr lang="fr" dirty="0" smtClean="0"/>
               <a:t>Contexte </a:t>
             </a:r>
             <a:r>
@@ -4801,26 +5430,39 @@
                   <a:schemeClr val="bg2"/>
                 </a:solidFill>
               </a:rPr>
-              <a:t>“Origin Analysis”</a:t>
-            </a:r>
+              <a:t>“Origin Analysis</a:t>
+            </a:r>
+            <a:r>
+              <a:rPr lang="fr" sz="1400" dirty="0" smtClean="0">
+                <a:solidFill>
+                  <a:schemeClr val="bg2"/>
+                </a:solidFill>
+              </a:rPr>
+              <a:t>” *</a:t>
+            </a:r>
+            <a:endParaRPr lang="fr" sz="1400" dirty="0">
+              <a:solidFill>
+                <a:schemeClr val="bg2"/>
+              </a:solidFill>
+            </a:endParaRPr>
           </a:p>
         </p:txBody>
       </p:sp>
       <p:pic>
         <p:nvPicPr>
-          <p:cNvPr id="79" name="Shape 79"/>
+          <p:cNvPr id="67" name="Shape 67"/>
           <p:cNvPicPr preferRelativeResize="0"/>
           <p:nvPr/>
         </p:nvPicPr>
         <p:blipFill rotWithShape="1">
           <a:blip r:embed="rId3"/>
-          <a:srcRect b="30872"/>
+          <a:srcRect b="31483"/>
           <a:stretch/>
         </p:blipFill>
         <p:spPr>
           <a:xfrm>
-            <a:off x="1143000" y="1274025"/>
-            <a:ext cx="6858000" cy="3555550"/>
+            <a:off x="1143000" y="1307400"/>
+            <a:ext cx="6858000" cy="3524250"/>
           </a:xfrm>
           <a:prstGeom prst="rect">
             <a:avLst/>
@@ -4831,6 +5473,91 @@
           </a:ln>
         </p:spPr>
       </p:pic>
+      <p:sp>
+        <p:nvSpPr>
+          <p:cNvPr id="2" name="TextBox 1"/>
+          <p:cNvSpPr txBox="1"/>
+          <p:nvPr/>
+        </p:nvSpPr>
+        <p:spPr>
+          <a:xfrm>
+            <a:off x="395536" y="4587974"/>
+            <a:ext cx="5328592" cy="461665"/>
+          </a:xfrm>
+          <a:prstGeom prst="rect">
+            <a:avLst/>
+          </a:prstGeom>
+          <a:noFill/>
+        </p:spPr>
+        <p:txBody>
+          <a:bodyPr wrap="square" rtlCol="0">
+            <a:spAutoFit/>
+          </a:bodyPr>
+          <a:lstStyle/>
+          <a:p>
+            <a:r>
+              <a:rPr lang="en-US" sz="1200" dirty="0" smtClean="0">
+                <a:solidFill>
+                  <a:schemeClr val="bg2"/>
+                </a:solidFill>
+              </a:rPr>
+              <a:t>* Godfrey et al, </a:t>
+            </a:r>
+            <a:br>
+              <a:rPr lang="en-US" sz="1200" dirty="0" smtClean="0">
+                <a:solidFill>
+                  <a:schemeClr val="bg2"/>
+                </a:solidFill>
+              </a:rPr>
+            </a:br>
+            <a:r>
+              <a:rPr lang="en-US" sz="1200" dirty="0" smtClean="0">
+                <a:solidFill>
+                  <a:schemeClr val="bg2"/>
+                </a:solidFill>
+              </a:rPr>
+              <a:t>“An </a:t>
+            </a:r>
+            <a:r>
+              <a:rPr lang="en-US" sz="1200" dirty="0">
+                <a:solidFill>
+                  <a:schemeClr val="bg2"/>
+                </a:solidFill>
+              </a:rPr>
+              <a:t>integrated approach for </a:t>
+            </a:r>
+            <a:r>
+              <a:rPr lang="en-US" sz="1200" dirty="0" smtClean="0">
+                <a:solidFill>
+                  <a:schemeClr val="bg2"/>
+                </a:solidFill>
+              </a:rPr>
+              <a:t>studying architectural evolution”</a:t>
+            </a:r>
+            <a:r>
+              <a:rPr lang="fr-FR" sz="1200" dirty="0" smtClean="0">
+                <a:solidFill>
+                  <a:schemeClr val="bg2"/>
+                </a:solidFill>
+              </a:rPr>
+              <a:t>, </a:t>
+            </a:r>
+            <a:r>
+              <a:rPr lang="fr-FR" sz="1200" dirty="0">
+                <a:solidFill>
+                  <a:schemeClr val="bg2"/>
+                </a:solidFill>
+              </a:rPr>
+              <a:t>2002</a:t>
+            </a:r>
+            <a:endParaRPr lang="fr-FR" sz="1200" dirty="0">
+              <a:solidFill>
+                <a:schemeClr val="bg2"/>
+              </a:solidFill>
+            </a:endParaRPr>
+          </a:p>
+        </p:txBody>
+      </p:sp>
     </p:spTree>
   </p:cSld>
   <p:clrMapOvr>
@@ -4854,7 +5581,7 @@
   <p:cSld>
     <p:spTree>
       <p:nvGrpSpPr>
-        <p:cNvPr id="1" name="Shape 83"/>
+        <p:cNvPr id="1" name="Shape 71"/>
         <p:cNvGrpSpPr/>
         <p:nvPr/>
       </p:nvGrpSpPr>
@@ -4868,7 +5595,7 @@
       </p:grpSpPr>
       <p:sp>
         <p:nvSpPr>
-          <p:cNvPr id="84" name="Shape 84"/>
+          <p:cNvPr id="72" name="Shape 72"/>
           <p:cNvSpPr txBox="1">
             <a:spLocks noGrp="1"/>
           </p:cNvSpPr>
@@ -4886,20 +5613,15 @@
           </a:prstGeom>
         </p:spPr>
         <p:txBody>
-          <a:bodyPr lIns="91425" tIns="91425" rIns="91425" bIns="91425" anchor="ctr" anchorCtr="0">
+          <a:bodyPr lIns="91425" tIns="91425" rIns="91425" bIns="91425" anchor="b" anchorCtr="0">
             <a:noAutofit/>
           </a:bodyPr>
           <a:lstStyle/>
           <a:p>
-            <a:pPr>
-              <a:spcBef>
-                <a:spcPts val="0"/>
-              </a:spcBef>
-              <a:buNone/>
-            </a:pPr>
-            <a:r>
-              <a:rPr lang="fr" dirty="0" smtClean="0"/>
-              <a:t>Méthodologie </a:t>
+            <a:pPr lvl="0"/>
+            <a:r>
+              <a:rPr lang="fr" dirty="0"/>
+              <a:t>Contexte </a:t>
             </a:r>
             <a:r>
               <a:rPr lang="fr" sz="1400" dirty="0">
@@ -4907,27 +5629,26 @@
                   <a:schemeClr val="bg2"/>
                 </a:solidFill>
               </a:rPr>
-              <a:t>corpus</a:t>
+              <a:t>“Origin Analysis”</a:t>
             </a:r>
           </a:p>
         </p:txBody>
       </p:sp>
       <p:pic>
         <p:nvPicPr>
-          <p:cNvPr id="85" name="Shape 85"/>
+          <p:cNvPr id="73" name="Shape 73"/>
           <p:cNvPicPr preferRelativeResize="0"/>
           <p:nvPr/>
         </p:nvPicPr>
-        <p:blipFill>
+        <p:blipFill rotWithShape="1">
           <a:blip r:embed="rId3"/>
-          <a:stretch>
-            <a:fillRect/>
-          </a:stretch>
+          <a:srcRect b="32849"/>
+          <a:stretch/>
         </p:blipFill>
         <p:spPr>
           <a:xfrm>
-            <a:off x="395536" y="1635646"/>
-            <a:ext cx="8280920" cy="2052003"/>
+            <a:off x="1143000" y="1327225"/>
+            <a:ext cx="6858000" cy="3453800"/>
           </a:xfrm>
           <a:prstGeom prst="rect">
             <a:avLst/>
@@ -4938,36 +5659,6 @@
           </a:ln>
         </p:spPr>
       </p:pic>
-      <p:sp>
-        <p:nvSpPr>
-          <p:cNvPr id="2" name="TextBox 1"/>
-          <p:cNvSpPr txBox="1"/>
-          <p:nvPr/>
-        </p:nvSpPr>
-        <p:spPr>
-          <a:xfrm>
-            <a:off x="611560" y="1347614"/>
-            <a:ext cx="3744416" cy="369332"/>
-          </a:xfrm>
-          <a:prstGeom prst="rect">
-            <a:avLst/>
-          </a:prstGeom>
-          <a:noFill/>
-        </p:spPr>
-        <p:txBody>
-          <a:bodyPr wrap="square" rtlCol="0">
-            <a:spAutoFit/>
-          </a:bodyPr>
-          <a:lstStyle/>
-          <a:p>
-            <a:r>
-              <a:rPr lang="fr-FR" sz="1800" dirty="0" smtClean="0"/>
-              <a:t>5 projets open-source :</a:t>
-            </a:r>
-            <a:endParaRPr lang="fr-FR" sz="1800" dirty="0"/>
-          </a:p>
-        </p:txBody>
-      </p:sp>
     </p:spTree>
   </p:cSld>
   <p:clrMapOvr>
@@ -4991,7 +5682,7 @@
   <p:cSld>
     <p:spTree>
       <p:nvGrpSpPr>
-        <p:cNvPr id="1" name="Shape 89"/>
+        <p:cNvPr id="1" name="Shape 77"/>
         <p:cNvGrpSpPr/>
         <p:nvPr/>
       </p:nvGrpSpPr>
@@ -5005,7 +5696,7 @@
       </p:grpSpPr>
       <p:sp>
         <p:nvSpPr>
-          <p:cNvPr id="90" name="Shape 90"/>
+          <p:cNvPr id="78" name="Shape 78"/>
           <p:cNvSpPr txBox="1">
             <a:spLocks noGrp="1"/>
           </p:cNvSpPr>
@@ -5023,20 +5714,14 @@
           </a:prstGeom>
         </p:spPr>
         <p:txBody>
-          <a:bodyPr lIns="91425" tIns="91425" rIns="91425" bIns="91425" anchor="ctr" anchorCtr="0">
+          <a:bodyPr lIns="91425" tIns="91425" rIns="91425" bIns="91425" anchor="b" anchorCtr="0">
             <a:noAutofit/>
           </a:bodyPr>
           <a:lstStyle/>
           <a:p>
-            <a:pPr lvl="0" rtl="0">
-              <a:spcBef>
-                <a:spcPts val="0"/>
-              </a:spcBef>
-              <a:buNone/>
-            </a:pPr>
-            <a:r>
-              <a:rPr lang="fr" dirty="0" smtClean="0"/>
-              <a:t>Méthodologie </a:t>
+            <a:r>
+              <a:rPr lang="fr" dirty="0"/>
+              <a:t>Contexte </a:t>
             </a:r>
             <a:r>
               <a:rPr lang="fr" sz="1400" dirty="0">
@@ -5044,104 +5729,34 @@
                   <a:schemeClr val="bg2"/>
                 </a:solidFill>
               </a:rPr>
-              <a:t>première expérience</a:t>
-            </a:r>
-          </a:p>
-        </p:txBody>
-      </p:sp>
-      <p:sp>
-        <p:nvSpPr>
-          <p:cNvPr id="92" name="Shape 92"/>
-          <p:cNvSpPr txBox="1"/>
-          <p:nvPr/>
-        </p:nvSpPr>
-        <p:spPr>
-          <a:xfrm>
-            <a:off x="5919200" y="1692325"/>
-            <a:ext cx="2873100" cy="2630400"/>
-          </a:xfrm>
-          <a:prstGeom prst="rect">
-            <a:avLst/>
-          </a:prstGeom>
-        </p:spPr>
-        <p:txBody>
-          <a:bodyPr lIns="91425" tIns="91425" rIns="91425" bIns="91425" anchor="t" anchorCtr="0">
-            <a:noAutofit/>
-          </a:bodyPr>
-          <a:lstStyle/>
-          <a:p>
-            <a:pPr marL="457200" lvl="0" indent="-381000" rtl="0">
-              <a:spcBef>
-                <a:spcPts val="0"/>
-              </a:spcBef>
-              <a:buClr>
-                <a:srgbClr val="000000"/>
-              </a:buClr>
-              <a:buSzPct val="100000"/>
-              <a:buFont typeface="Arial"/>
-              <a:buChar char="●"/>
-            </a:pPr>
-            <a:r>
-              <a:rPr lang="fr" sz="2400"/>
-              <a:t>Quantité de renommage</a:t>
-            </a:r>
-          </a:p>
-          <a:p>
-            <a:pPr lvl="0" rtl="0">
-              <a:spcBef>
-                <a:spcPts val="0"/>
-              </a:spcBef>
-              <a:buNone/>
-            </a:pPr>
-            <a:endParaRPr lang="fr" sz="2400"/>
-          </a:p>
-          <a:p>
-            <a:pPr marL="457200" lvl="0" indent="-381000">
-              <a:spcBef>
-                <a:spcPts val="0"/>
-              </a:spcBef>
-              <a:buClr>
-                <a:srgbClr val="000000"/>
-              </a:buClr>
-              <a:buSzPct val="100000"/>
-              <a:buFont typeface="Arial"/>
-              <a:buChar char="●"/>
-            </a:pPr>
-            <a:r>
-              <a:rPr lang="fr" sz="2400"/>
-              <a:t>Localization</a:t>
+              <a:t>“Origin Analysis”</a:t>
             </a:r>
           </a:p>
         </p:txBody>
       </p:sp>
       <p:pic>
         <p:nvPicPr>
-          <p:cNvPr id="2" name="Picture 1"/>
-          <p:cNvPicPr>
-            <a:picLocks noChangeAspect="1"/>
-          </p:cNvPicPr>
+          <p:cNvPr id="79" name="Shape 79"/>
+          <p:cNvPicPr preferRelativeResize="0"/>
           <p:nvPr/>
         </p:nvPicPr>
-        <p:blipFill>
-          <a:blip r:embed="rId3">
-            <a:extLst>
-              <a:ext uri="{28A0092B-C50C-407E-A947-70E740481C1C}">
-                <a14:useLocalDpi xmlns:a14="http://schemas.microsoft.com/office/drawing/2010/main" val="0"/>
-              </a:ext>
-            </a:extLst>
-          </a:blip>
-          <a:stretch>
-            <a:fillRect/>
-          </a:stretch>
+        <p:blipFill rotWithShape="1">
+          <a:blip r:embed="rId3"/>
+          <a:srcRect b="30872"/>
+          <a:stretch/>
         </p:blipFill>
         <p:spPr>
           <a:xfrm>
-            <a:off x="1475656" y="1059582"/>
-            <a:ext cx="4631704" cy="3842472"/>
-          </a:xfrm>
-          <a:prstGeom prst="rect">
-            <a:avLst/>
-          </a:prstGeom>
+            <a:off x="1143000" y="1274025"/>
+            <a:ext cx="6858000" cy="3555550"/>
+          </a:xfrm>
+          <a:prstGeom prst="rect">
+            <a:avLst/>
+          </a:prstGeom>
+          <a:noFill/>
+          <a:ln>
+            <a:noFill/>
+          </a:ln>
         </p:spPr>
       </p:pic>
     </p:spTree>
@@ -5167,7 +5782,7 @@
   <p:cSld>
     <p:spTree>
       <p:nvGrpSpPr>
-        <p:cNvPr id="1" name="Shape 89"/>
+        <p:cNvPr id="1" name=""/>
         <p:cNvGrpSpPr/>
         <p:nvPr/>
       </p:nvGrpSpPr>
@@ -5181,159 +5796,82 @@
       </p:grpSpPr>
       <p:sp>
         <p:nvSpPr>
-          <p:cNvPr id="90" name="Shape 90"/>
-          <p:cNvSpPr txBox="1">
+          <p:cNvPr id="2" name="Title 1"/>
+          <p:cNvSpPr>
             <a:spLocks noGrp="1"/>
           </p:cNvSpPr>
           <p:nvPr>
             <p:ph type="title"/>
           </p:nvPr>
         </p:nvSpPr>
-        <p:spPr>
-          <a:xfrm>
-            <a:off x="457200" y="205978"/>
-            <a:ext cx="8229600" cy="857400"/>
-          </a:xfrm>
-          <a:prstGeom prst="rect">
-            <a:avLst/>
-          </a:prstGeom>
-        </p:spPr>
+        <p:spPr/>
         <p:txBody>
-          <a:bodyPr lIns="91425" tIns="91425" rIns="91425" bIns="91425" anchor="ctr" anchorCtr="0">
-            <a:noAutofit/>
-          </a:bodyPr>
+          <a:bodyPr/>
           <a:lstStyle/>
           <a:p>
             <a:r>
-              <a:rPr lang="fr" dirty="0" smtClean="0"/>
-              <a:t>Méthodologie </a:t>
-            </a:r>
-            <a:r>
-              <a:rPr lang="fr" sz="1400" dirty="0">
-                <a:solidFill>
-                  <a:schemeClr val="bg2"/>
-                </a:solidFill>
-              </a:rPr>
-              <a:t>première expérience</a:t>
-            </a:r>
+              <a:rPr lang="fr-FR" dirty="0" err="1" smtClean="0"/>
+              <a:t>Research</a:t>
+            </a:r>
+            <a:r>
+              <a:rPr lang="fr-FR" dirty="0" smtClean="0"/>
+              <a:t> Question</a:t>
+            </a:r>
+            <a:endParaRPr lang="fr-FR" dirty="0"/>
           </a:p>
         </p:txBody>
       </p:sp>
       <p:sp>
         <p:nvSpPr>
-          <p:cNvPr id="92" name="Shape 92"/>
-          <p:cNvSpPr txBox="1"/>
-          <p:nvPr/>
-        </p:nvSpPr>
-        <p:spPr>
-          <a:xfrm>
-            <a:off x="5919200" y="1692325"/>
-            <a:ext cx="2873100" cy="2630400"/>
-          </a:xfrm>
-          <a:prstGeom prst="rect">
-            <a:avLst/>
-          </a:prstGeom>
-        </p:spPr>
+          <p:cNvPr id="3" name="Text Placeholder 2"/>
+          <p:cNvSpPr>
+            <a:spLocks noGrp="1"/>
+          </p:cNvSpPr>
+          <p:nvPr>
+            <p:ph type="body" idx="1"/>
+          </p:nvPr>
+        </p:nvSpPr>
+        <p:spPr/>
         <p:txBody>
-          <a:bodyPr lIns="91425" tIns="91425" rIns="91425" bIns="91425" anchor="t" anchorCtr="0">
-            <a:noAutofit/>
-          </a:bodyPr>
+          <a:bodyPr/>
           <a:lstStyle/>
           <a:p>
-            <a:pPr marL="457200" lvl="0" indent="-381000" rtl="0">
-              <a:spcBef>
-                <a:spcPts val="0"/>
-              </a:spcBef>
-              <a:buClr>
-                <a:srgbClr val="000000"/>
-              </a:buClr>
-              <a:buSzPct val="100000"/>
-              <a:buFont typeface="Arial"/>
-              <a:buChar char="●"/>
+            <a:pPr marL="457200" indent="-457200">
+              <a:buFont typeface="Arial" panose="020B0604020202020204" pitchFamily="34" charset="0"/>
+              <a:buChar char="•"/>
             </a:pPr>
             <a:r>
-              <a:rPr lang="fr" sz="2400"/>
-              <a:t>Quantité de renommage</a:t>
-            </a:r>
-          </a:p>
-          <a:p>
-            <a:pPr lvl="0" rtl="0">
-              <a:spcBef>
-                <a:spcPts val="0"/>
-              </a:spcBef>
-              <a:buNone/>
+              <a:rPr lang="fr-FR" dirty="0" smtClean="0"/>
+              <a:t>La quantité de renommage dans les projets.</a:t>
+            </a:r>
+            <a:br>
+              <a:rPr lang="fr-FR" dirty="0" smtClean="0"/>
+            </a:br>
+            <a:endParaRPr lang="fr-FR" dirty="0" smtClean="0"/>
+          </a:p>
+          <a:p>
+            <a:pPr marL="457200" indent="-457200">
+              <a:buFont typeface="Arial" panose="020B0604020202020204" pitchFamily="34" charset="0"/>
+              <a:buChar char="•"/>
             </a:pPr>
-            <a:endParaRPr lang="fr" sz="2400"/>
-          </a:p>
-          <a:p>
-            <a:pPr marL="457200" lvl="0" indent="-381000">
-              <a:spcBef>
-                <a:spcPts val="0"/>
-              </a:spcBef>
-              <a:buClr>
-                <a:srgbClr val="000000"/>
-              </a:buClr>
-              <a:buSzPct val="100000"/>
-              <a:buFont typeface="Arial"/>
-              <a:buChar char="●"/>
-            </a:pPr>
-            <a:r>
-              <a:rPr lang="fr" sz="2400"/>
-              <a:t>Localization</a:t>
-            </a:r>
+            <a:r>
+              <a:rPr lang="fr-FR" dirty="0" smtClean="0"/>
+              <a:t>Son impact sur les métriques.</a:t>
+            </a:r>
+            <a:endParaRPr lang="fr-FR" dirty="0"/>
           </a:p>
         </p:txBody>
       </p:sp>
-      <p:pic>
-        <p:nvPicPr>
-          <p:cNvPr id="2" name="Picture 1"/>
-          <p:cNvPicPr>
-            <a:picLocks noChangeAspect="1"/>
-          </p:cNvPicPr>
-          <p:nvPr/>
-        </p:nvPicPr>
-        <p:blipFill>
-          <a:blip r:embed="rId3">
-            <a:extLst>
-              <a:ext uri="{28A0092B-C50C-407E-A947-70E740481C1C}">
-                <a14:useLocalDpi xmlns:a14="http://schemas.microsoft.com/office/drawing/2010/main" val="0"/>
-              </a:ext>
-            </a:extLst>
-          </a:blip>
-          <a:stretch>
-            <a:fillRect/>
-          </a:stretch>
-        </p:blipFill>
-        <p:spPr>
-          <a:xfrm>
-            <a:off x="1496640" y="1037574"/>
-            <a:ext cx="4749147" cy="3939902"/>
-          </a:xfrm>
-          <a:prstGeom prst="rect">
-            <a:avLst/>
-          </a:prstGeom>
-        </p:spPr>
-      </p:pic>
     </p:spTree>
     <p:extLst>
       <p:ext uri="{BB962C8B-B14F-4D97-AF65-F5344CB8AC3E}">
-        <p14:creationId xmlns:p14="http://schemas.microsoft.com/office/powerpoint/2010/main" val="2464408399"/>
+        <p14:creationId xmlns:p14="http://schemas.microsoft.com/office/powerpoint/2010/main" val="4011224614"/>
       </p:ext>
     </p:extLst>
   </p:cSld>
   <p:clrMapOvr>
     <a:masterClrMapping/>
   </p:clrMapOvr>
-  <p:transition spd="slow">
-    <p:cut/>
-  </p:transition>
-  <p:timing>
-    <p:tnLst>
-      <p:par>
-        <p:cTn id="1" dur="indefinite" restart="never" nodeType="tmRoot"/>
-      </p:par>
-    </p:tnLst>
-  </p:timing>
 </p:sld>
 </file>
 
@@ -5342,7 +5880,7 @@
   <p:cSld>
     <p:spTree>
       <p:nvGrpSpPr>
-        <p:cNvPr id="1" name="Shape 89"/>
+        <p:cNvPr id="1" name="Shape 83"/>
         <p:cNvGrpSpPr/>
         <p:nvPr/>
       </p:nvGrpSpPr>
@@ -5356,7 +5894,7 @@
       </p:grpSpPr>
       <p:sp>
         <p:nvSpPr>
-          <p:cNvPr id="90" name="Shape 90"/>
+          <p:cNvPr id="84" name="Shape 84"/>
           <p:cNvSpPr txBox="1">
             <a:spLocks noGrp="1"/>
           </p:cNvSpPr>
@@ -5379,7 +5917,7 @@
           </a:bodyPr>
           <a:lstStyle/>
           <a:p>
-            <a:pPr lvl="0" rtl="0">
+            <a:pPr>
               <a:spcBef>
                 <a:spcPts val="0"/>
               </a:spcBef>
@@ -5395,112 +5933,68 @@
                   <a:schemeClr val="bg2"/>
                 </a:solidFill>
               </a:rPr>
-              <a:t>première expérience</a:t>
-            </a:r>
-          </a:p>
-        </p:txBody>
-      </p:sp>
-      <p:sp>
-        <p:nvSpPr>
-          <p:cNvPr id="92" name="Shape 92"/>
-          <p:cNvSpPr txBox="1"/>
-          <p:nvPr/>
-        </p:nvSpPr>
-        <p:spPr>
-          <a:xfrm>
-            <a:off x="5919200" y="1692325"/>
-            <a:ext cx="2873100" cy="2630400"/>
-          </a:xfrm>
-          <a:prstGeom prst="rect">
-            <a:avLst/>
-          </a:prstGeom>
-        </p:spPr>
-        <p:txBody>
-          <a:bodyPr lIns="91425" tIns="91425" rIns="91425" bIns="91425" anchor="t" anchorCtr="0">
-            <a:noAutofit/>
-          </a:bodyPr>
-          <a:lstStyle/>
-          <a:p>
-            <a:pPr marL="457200" lvl="0" indent="-381000" rtl="0">
-              <a:spcBef>
-                <a:spcPts val="0"/>
-              </a:spcBef>
-              <a:buClr>
-                <a:srgbClr val="000000"/>
-              </a:buClr>
-              <a:buSzPct val="100000"/>
-              <a:buFont typeface="Arial"/>
-              <a:buChar char="●"/>
-            </a:pPr>
-            <a:r>
-              <a:rPr lang="fr" sz="2400"/>
-              <a:t>Quantité de renommage</a:t>
-            </a:r>
-          </a:p>
-          <a:p>
-            <a:pPr lvl="0" rtl="0">
-              <a:spcBef>
-                <a:spcPts val="0"/>
-              </a:spcBef>
-              <a:buNone/>
-            </a:pPr>
-            <a:endParaRPr lang="fr" sz="2400"/>
-          </a:p>
-          <a:p>
-            <a:pPr marL="457200" lvl="0" indent="-381000">
-              <a:spcBef>
-                <a:spcPts val="0"/>
-              </a:spcBef>
-              <a:buClr>
-                <a:srgbClr val="000000"/>
-              </a:buClr>
-              <a:buSzPct val="100000"/>
-              <a:buFont typeface="Arial"/>
-              <a:buChar char="●"/>
-            </a:pPr>
-            <a:r>
-              <a:rPr lang="fr" sz="2400"/>
-              <a:t>Localization</a:t>
+              <a:t>corpus</a:t>
             </a:r>
           </a:p>
         </p:txBody>
       </p:sp>
       <p:pic>
         <p:nvPicPr>
-          <p:cNvPr id="2" name="Picture 1"/>
-          <p:cNvPicPr>
-            <a:picLocks noChangeAspect="1"/>
-          </p:cNvPicPr>
+          <p:cNvPr id="85" name="Shape 85"/>
+          <p:cNvPicPr preferRelativeResize="0"/>
           <p:nvPr/>
         </p:nvPicPr>
         <p:blipFill>
-          <a:blip r:embed="rId3">
-            <a:extLst>
-              <a:ext uri="{28A0092B-C50C-407E-A947-70E740481C1C}">
-                <a14:useLocalDpi xmlns:a14="http://schemas.microsoft.com/office/drawing/2010/main" val="0"/>
-              </a:ext>
-            </a:extLst>
-          </a:blip>
+          <a:blip r:embed="rId3"/>
           <a:stretch>
             <a:fillRect/>
           </a:stretch>
         </p:blipFill>
         <p:spPr>
           <a:xfrm>
-            <a:off x="1547664" y="1066040"/>
-            <a:ext cx="4680520" cy="3882969"/>
-          </a:xfrm>
-          <a:prstGeom prst="rect">
-            <a:avLst/>
-          </a:prstGeom>
+            <a:off x="395536" y="1635646"/>
+            <a:ext cx="8280920" cy="2052003"/>
+          </a:xfrm>
+          <a:prstGeom prst="rect">
+            <a:avLst/>
+          </a:prstGeom>
+          <a:noFill/>
+          <a:ln>
+            <a:noFill/>
+          </a:ln>
         </p:spPr>
       </p:pic>
+      <p:sp>
+        <p:nvSpPr>
+          <p:cNvPr id="2" name="TextBox 1"/>
+          <p:cNvSpPr txBox="1"/>
+          <p:nvPr/>
+        </p:nvSpPr>
+        <p:spPr>
+          <a:xfrm>
+            <a:off x="611560" y="1347614"/>
+            <a:ext cx="3744416" cy="369332"/>
+          </a:xfrm>
+          <a:prstGeom prst="rect">
+            <a:avLst/>
+          </a:prstGeom>
+          <a:noFill/>
+        </p:spPr>
+        <p:txBody>
+          <a:bodyPr wrap="square" rtlCol="0">
+            <a:spAutoFit/>
+          </a:bodyPr>
+          <a:lstStyle/>
+          <a:p>
+            <a:r>
+              <a:rPr lang="fr-FR" sz="1800" dirty="0" smtClean="0"/>
+              <a:t>5 projets open-source :</a:t>
+            </a:r>
+            <a:endParaRPr lang="fr-FR" sz="1800" dirty="0"/>
+          </a:p>
+        </p:txBody>
+      </p:sp>
     </p:spTree>
-    <p:extLst>
-      <p:ext uri="{BB962C8B-B14F-4D97-AF65-F5344CB8AC3E}">
-        <p14:creationId xmlns:p14="http://schemas.microsoft.com/office/powerpoint/2010/main" val="1384647234"/>
-      </p:ext>
-    </p:extLst>
   </p:cSld>
   <p:clrMapOvr>
     <a:masterClrMapping/>
@@ -5668,6 +6162,538 @@
         </p:blipFill>
         <p:spPr>
           <a:xfrm>
+            <a:off x="1475656" y="1059582"/>
+            <a:ext cx="4631704" cy="3842472"/>
+          </a:xfrm>
+          <a:prstGeom prst="rect">
+            <a:avLst/>
+          </a:prstGeom>
+        </p:spPr>
+      </p:pic>
+    </p:spTree>
+  </p:cSld>
+  <p:clrMapOvr>
+    <a:masterClrMapping/>
+  </p:clrMapOvr>
+  <p:transition spd="slow">
+    <p:cut/>
+  </p:transition>
+  <p:timing>
+    <p:tnLst>
+      <p:par>
+        <p:cTn id="1" dur="indefinite" restart="never" nodeType="tmRoot"/>
+      </p:par>
+    </p:tnLst>
+  </p:timing>
+</p:sld>
+</file>
+
+<file path=ppt/slides/slide16.xml><?xml version="1.0" encoding="utf-8"?>
+<p:sld xmlns:a="http://schemas.openxmlformats.org/drawingml/2006/main" xmlns:r="http://schemas.openxmlformats.org/officeDocument/2006/relationships" xmlns:p="http://schemas.openxmlformats.org/presentationml/2006/main">
+  <p:cSld>
+    <p:spTree>
+      <p:nvGrpSpPr>
+        <p:cNvPr id="1" name="Shape 89"/>
+        <p:cNvGrpSpPr/>
+        <p:nvPr/>
+      </p:nvGrpSpPr>
+      <p:grpSpPr>
+        <a:xfrm>
+          <a:off x="0" y="0"/>
+          <a:ext cx="0" cy="0"/>
+          <a:chOff x="0" y="0"/>
+          <a:chExt cx="0" cy="0"/>
+        </a:xfrm>
+      </p:grpSpPr>
+      <p:sp>
+        <p:nvSpPr>
+          <p:cNvPr id="90" name="Shape 90"/>
+          <p:cNvSpPr txBox="1">
+            <a:spLocks noGrp="1"/>
+          </p:cNvSpPr>
+          <p:nvPr>
+            <p:ph type="title"/>
+          </p:nvPr>
+        </p:nvSpPr>
+        <p:spPr>
+          <a:xfrm>
+            <a:off x="457200" y="205978"/>
+            <a:ext cx="8229600" cy="857400"/>
+          </a:xfrm>
+          <a:prstGeom prst="rect">
+            <a:avLst/>
+          </a:prstGeom>
+        </p:spPr>
+        <p:txBody>
+          <a:bodyPr lIns="91425" tIns="91425" rIns="91425" bIns="91425" anchor="ctr" anchorCtr="0">
+            <a:noAutofit/>
+          </a:bodyPr>
+          <a:lstStyle/>
+          <a:p>
+            <a:r>
+              <a:rPr lang="fr" dirty="0" smtClean="0"/>
+              <a:t>Méthodologie </a:t>
+            </a:r>
+            <a:r>
+              <a:rPr lang="fr" sz="1400" dirty="0">
+                <a:solidFill>
+                  <a:schemeClr val="bg2"/>
+                </a:solidFill>
+              </a:rPr>
+              <a:t>première expérience</a:t>
+            </a:r>
+          </a:p>
+        </p:txBody>
+      </p:sp>
+      <p:sp>
+        <p:nvSpPr>
+          <p:cNvPr id="92" name="Shape 92"/>
+          <p:cNvSpPr txBox="1"/>
+          <p:nvPr/>
+        </p:nvSpPr>
+        <p:spPr>
+          <a:xfrm>
+            <a:off x="5919200" y="1692325"/>
+            <a:ext cx="2873100" cy="2630400"/>
+          </a:xfrm>
+          <a:prstGeom prst="rect">
+            <a:avLst/>
+          </a:prstGeom>
+        </p:spPr>
+        <p:txBody>
+          <a:bodyPr lIns="91425" tIns="91425" rIns="91425" bIns="91425" anchor="t" anchorCtr="0">
+            <a:noAutofit/>
+          </a:bodyPr>
+          <a:lstStyle/>
+          <a:p>
+            <a:pPr marL="457200" lvl="0" indent="-381000" rtl="0">
+              <a:spcBef>
+                <a:spcPts val="0"/>
+              </a:spcBef>
+              <a:buClr>
+                <a:srgbClr val="000000"/>
+              </a:buClr>
+              <a:buSzPct val="100000"/>
+              <a:buFont typeface="Arial"/>
+              <a:buChar char="●"/>
+            </a:pPr>
+            <a:r>
+              <a:rPr lang="fr" sz="2400"/>
+              <a:t>Quantité de renommage</a:t>
+            </a:r>
+          </a:p>
+          <a:p>
+            <a:pPr lvl="0" rtl="0">
+              <a:spcBef>
+                <a:spcPts val="0"/>
+              </a:spcBef>
+              <a:buNone/>
+            </a:pPr>
+            <a:endParaRPr lang="fr" sz="2400"/>
+          </a:p>
+          <a:p>
+            <a:pPr marL="457200" lvl="0" indent="-381000">
+              <a:spcBef>
+                <a:spcPts val="0"/>
+              </a:spcBef>
+              <a:buClr>
+                <a:srgbClr val="000000"/>
+              </a:buClr>
+              <a:buSzPct val="100000"/>
+              <a:buFont typeface="Arial"/>
+              <a:buChar char="●"/>
+            </a:pPr>
+            <a:r>
+              <a:rPr lang="fr" sz="2400"/>
+              <a:t>Localization</a:t>
+            </a:r>
+          </a:p>
+        </p:txBody>
+      </p:sp>
+      <p:pic>
+        <p:nvPicPr>
+          <p:cNvPr id="2" name="Picture 1"/>
+          <p:cNvPicPr>
+            <a:picLocks noChangeAspect="1"/>
+          </p:cNvPicPr>
+          <p:nvPr/>
+        </p:nvPicPr>
+        <p:blipFill>
+          <a:blip r:embed="rId3">
+            <a:extLst>
+              <a:ext uri="{28A0092B-C50C-407E-A947-70E740481C1C}">
+                <a14:useLocalDpi xmlns:a14="http://schemas.microsoft.com/office/drawing/2010/main" val="0"/>
+              </a:ext>
+            </a:extLst>
+          </a:blip>
+          <a:stretch>
+            <a:fillRect/>
+          </a:stretch>
+        </p:blipFill>
+        <p:spPr>
+          <a:xfrm>
+            <a:off x="1496640" y="1037574"/>
+            <a:ext cx="4749147" cy="3939902"/>
+          </a:xfrm>
+          <a:prstGeom prst="rect">
+            <a:avLst/>
+          </a:prstGeom>
+        </p:spPr>
+      </p:pic>
+    </p:spTree>
+    <p:extLst>
+      <p:ext uri="{BB962C8B-B14F-4D97-AF65-F5344CB8AC3E}">
+        <p14:creationId xmlns:p14="http://schemas.microsoft.com/office/powerpoint/2010/main" val="2464408399"/>
+      </p:ext>
+    </p:extLst>
+  </p:cSld>
+  <p:clrMapOvr>
+    <a:masterClrMapping/>
+  </p:clrMapOvr>
+  <p:transition spd="slow">
+    <p:cut/>
+  </p:transition>
+  <p:timing>
+    <p:tnLst>
+      <p:par>
+        <p:cTn id="1" dur="indefinite" restart="never" nodeType="tmRoot"/>
+      </p:par>
+    </p:tnLst>
+  </p:timing>
+</p:sld>
+</file>
+
+<file path=ppt/slides/slide17.xml><?xml version="1.0" encoding="utf-8"?>
+<p:sld xmlns:a="http://schemas.openxmlformats.org/drawingml/2006/main" xmlns:r="http://schemas.openxmlformats.org/officeDocument/2006/relationships" xmlns:p="http://schemas.openxmlformats.org/presentationml/2006/main">
+  <p:cSld>
+    <p:spTree>
+      <p:nvGrpSpPr>
+        <p:cNvPr id="1" name="Shape 89"/>
+        <p:cNvGrpSpPr/>
+        <p:nvPr/>
+      </p:nvGrpSpPr>
+      <p:grpSpPr>
+        <a:xfrm>
+          <a:off x="0" y="0"/>
+          <a:ext cx="0" cy="0"/>
+          <a:chOff x="0" y="0"/>
+          <a:chExt cx="0" cy="0"/>
+        </a:xfrm>
+      </p:grpSpPr>
+      <p:sp>
+        <p:nvSpPr>
+          <p:cNvPr id="90" name="Shape 90"/>
+          <p:cNvSpPr txBox="1">
+            <a:spLocks noGrp="1"/>
+          </p:cNvSpPr>
+          <p:nvPr>
+            <p:ph type="title"/>
+          </p:nvPr>
+        </p:nvSpPr>
+        <p:spPr>
+          <a:xfrm>
+            <a:off x="457200" y="205978"/>
+            <a:ext cx="8229600" cy="857400"/>
+          </a:xfrm>
+          <a:prstGeom prst="rect">
+            <a:avLst/>
+          </a:prstGeom>
+        </p:spPr>
+        <p:txBody>
+          <a:bodyPr lIns="91425" tIns="91425" rIns="91425" bIns="91425" anchor="ctr" anchorCtr="0">
+            <a:noAutofit/>
+          </a:bodyPr>
+          <a:lstStyle/>
+          <a:p>
+            <a:pPr lvl="0" rtl="0">
+              <a:spcBef>
+                <a:spcPts val="0"/>
+              </a:spcBef>
+              <a:buNone/>
+            </a:pPr>
+            <a:r>
+              <a:rPr lang="fr" dirty="0" smtClean="0"/>
+              <a:t>Méthodologie </a:t>
+            </a:r>
+            <a:r>
+              <a:rPr lang="fr" sz="1400" dirty="0">
+                <a:solidFill>
+                  <a:schemeClr val="bg2"/>
+                </a:solidFill>
+              </a:rPr>
+              <a:t>première expérience</a:t>
+            </a:r>
+          </a:p>
+        </p:txBody>
+      </p:sp>
+      <p:sp>
+        <p:nvSpPr>
+          <p:cNvPr id="92" name="Shape 92"/>
+          <p:cNvSpPr txBox="1"/>
+          <p:nvPr/>
+        </p:nvSpPr>
+        <p:spPr>
+          <a:xfrm>
+            <a:off x="5919200" y="1692325"/>
+            <a:ext cx="2873100" cy="2630400"/>
+          </a:xfrm>
+          <a:prstGeom prst="rect">
+            <a:avLst/>
+          </a:prstGeom>
+        </p:spPr>
+        <p:txBody>
+          <a:bodyPr lIns="91425" tIns="91425" rIns="91425" bIns="91425" anchor="t" anchorCtr="0">
+            <a:noAutofit/>
+          </a:bodyPr>
+          <a:lstStyle/>
+          <a:p>
+            <a:pPr marL="457200" lvl="0" indent="-381000" rtl="0">
+              <a:spcBef>
+                <a:spcPts val="0"/>
+              </a:spcBef>
+              <a:buClr>
+                <a:srgbClr val="000000"/>
+              </a:buClr>
+              <a:buSzPct val="100000"/>
+              <a:buFont typeface="Arial"/>
+              <a:buChar char="●"/>
+            </a:pPr>
+            <a:r>
+              <a:rPr lang="fr" sz="2400"/>
+              <a:t>Quantité de renommage</a:t>
+            </a:r>
+          </a:p>
+          <a:p>
+            <a:pPr lvl="0" rtl="0">
+              <a:spcBef>
+                <a:spcPts val="0"/>
+              </a:spcBef>
+              <a:buNone/>
+            </a:pPr>
+            <a:endParaRPr lang="fr" sz="2400"/>
+          </a:p>
+          <a:p>
+            <a:pPr marL="457200" lvl="0" indent="-381000">
+              <a:spcBef>
+                <a:spcPts val="0"/>
+              </a:spcBef>
+              <a:buClr>
+                <a:srgbClr val="000000"/>
+              </a:buClr>
+              <a:buSzPct val="100000"/>
+              <a:buFont typeface="Arial"/>
+              <a:buChar char="●"/>
+            </a:pPr>
+            <a:r>
+              <a:rPr lang="fr" sz="2400"/>
+              <a:t>Localization</a:t>
+            </a:r>
+          </a:p>
+        </p:txBody>
+      </p:sp>
+      <p:pic>
+        <p:nvPicPr>
+          <p:cNvPr id="2" name="Picture 1"/>
+          <p:cNvPicPr>
+            <a:picLocks noChangeAspect="1"/>
+          </p:cNvPicPr>
+          <p:nvPr/>
+        </p:nvPicPr>
+        <p:blipFill>
+          <a:blip r:embed="rId3">
+            <a:extLst>
+              <a:ext uri="{28A0092B-C50C-407E-A947-70E740481C1C}">
+                <a14:useLocalDpi xmlns:a14="http://schemas.microsoft.com/office/drawing/2010/main" val="0"/>
+              </a:ext>
+            </a:extLst>
+          </a:blip>
+          <a:stretch>
+            <a:fillRect/>
+          </a:stretch>
+        </p:blipFill>
+        <p:spPr>
+          <a:xfrm>
+            <a:off x="1547664" y="1066040"/>
+            <a:ext cx="4680520" cy="3882969"/>
+          </a:xfrm>
+          <a:prstGeom prst="rect">
+            <a:avLst/>
+          </a:prstGeom>
+        </p:spPr>
+      </p:pic>
+    </p:spTree>
+    <p:extLst>
+      <p:ext uri="{BB962C8B-B14F-4D97-AF65-F5344CB8AC3E}">
+        <p14:creationId xmlns:p14="http://schemas.microsoft.com/office/powerpoint/2010/main" val="1384647234"/>
+      </p:ext>
+    </p:extLst>
+  </p:cSld>
+  <p:clrMapOvr>
+    <a:masterClrMapping/>
+  </p:clrMapOvr>
+  <p:transition spd="slow">
+    <p:cut/>
+  </p:transition>
+  <p:timing>
+    <p:tnLst>
+      <p:par>
+        <p:cTn id="1" dur="indefinite" restart="never" nodeType="tmRoot"/>
+      </p:par>
+    </p:tnLst>
+  </p:timing>
+</p:sld>
+</file>
+
+<file path=ppt/slides/slide18.xml><?xml version="1.0" encoding="utf-8"?>
+<p:sld xmlns:a="http://schemas.openxmlformats.org/drawingml/2006/main" xmlns:r="http://schemas.openxmlformats.org/officeDocument/2006/relationships" xmlns:p="http://schemas.openxmlformats.org/presentationml/2006/main">
+  <p:cSld>
+    <p:spTree>
+      <p:nvGrpSpPr>
+        <p:cNvPr id="1" name="Shape 89"/>
+        <p:cNvGrpSpPr/>
+        <p:nvPr/>
+      </p:nvGrpSpPr>
+      <p:grpSpPr>
+        <a:xfrm>
+          <a:off x="0" y="0"/>
+          <a:ext cx="0" cy="0"/>
+          <a:chOff x="0" y="0"/>
+          <a:chExt cx="0" cy="0"/>
+        </a:xfrm>
+      </p:grpSpPr>
+      <p:sp>
+        <p:nvSpPr>
+          <p:cNvPr id="90" name="Shape 90"/>
+          <p:cNvSpPr txBox="1">
+            <a:spLocks noGrp="1"/>
+          </p:cNvSpPr>
+          <p:nvPr>
+            <p:ph type="title"/>
+          </p:nvPr>
+        </p:nvSpPr>
+        <p:spPr>
+          <a:xfrm>
+            <a:off x="457200" y="205978"/>
+            <a:ext cx="8229600" cy="857400"/>
+          </a:xfrm>
+          <a:prstGeom prst="rect">
+            <a:avLst/>
+          </a:prstGeom>
+        </p:spPr>
+        <p:txBody>
+          <a:bodyPr lIns="91425" tIns="91425" rIns="91425" bIns="91425" anchor="ctr" anchorCtr="0">
+            <a:noAutofit/>
+          </a:bodyPr>
+          <a:lstStyle/>
+          <a:p>
+            <a:pPr lvl="0" rtl="0">
+              <a:spcBef>
+                <a:spcPts val="0"/>
+              </a:spcBef>
+              <a:buNone/>
+            </a:pPr>
+            <a:r>
+              <a:rPr lang="fr" dirty="0" smtClean="0"/>
+              <a:t>Méthodologie </a:t>
+            </a:r>
+            <a:r>
+              <a:rPr lang="fr" sz="1400" dirty="0">
+                <a:solidFill>
+                  <a:schemeClr val="bg2"/>
+                </a:solidFill>
+              </a:rPr>
+              <a:t>première expérience</a:t>
+            </a:r>
+          </a:p>
+        </p:txBody>
+      </p:sp>
+      <p:sp>
+        <p:nvSpPr>
+          <p:cNvPr id="92" name="Shape 92"/>
+          <p:cNvSpPr txBox="1"/>
+          <p:nvPr/>
+        </p:nvSpPr>
+        <p:spPr>
+          <a:xfrm>
+            <a:off x="5919200" y="1692325"/>
+            <a:ext cx="2873100" cy="2630400"/>
+          </a:xfrm>
+          <a:prstGeom prst="rect">
+            <a:avLst/>
+          </a:prstGeom>
+        </p:spPr>
+        <p:txBody>
+          <a:bodyPr lIns="91425" tIns="91425" rIns="91425" bIns="91425" anchor="t" anchorCtr="0">
+            <a:noAutofit/>
+          </a:bodyPr>
+          <a:lstStyle/>
+          <a:p>
+            <a:pPr marL="457200" lvl="0" indent="-381000" rtl="0">
+              <a:spcBef>
+                <a:spcPts val="0"/>
+              </a:spcBef>
+              <a:buClr>
+                <a:srgbClr val="000000"/>
+              </a:buClr>
+              <a:buSzPct val="100000"/>
+              <a:buFont typeface="Arial"/>
+              <a:buChar char="●"/>
+            </a:pPr>
+            <a:r>
+              <a:rPr lang="fr" sz="2400"/>
+              <a:t>Quantité de renommage</a:t>
+            </a:r>
+          </a:p>
+          <a:p>
+            <a:pPr lvl="0" rtl="0">
+              <a:spcBef>
+                <a:spcPts val="0"/>
+              </a:spcBef>
+              <a:buNone/>
+            </a:pPr>
+            <a:endParaRPr lang="fr" sz="2400"/>
+          </a:p>
+          <a:p>
+            <a:pPr marL="457200" lvl="0" indent="-381000">
+              <a:spcBef>
+                <a:spcPts val="0"/>
+              </a:spcBef>
+              <a:buClr>
+                <a:srgbClr val="000000"/>
+              </a:buClr>
+              <a:buSzPct val="100000"/>
+              <a:buFont typeface="Arial"/>
+              <a:buChar char="●"/>
+            </a:pPr>
+            <a:r>
+              <a:rPr lang="fr" sz="2400"/>
+              <a:t>Localization</a:t>
+            </a:r>
+          </a:p>
+        </p:txBody>
+      </p:sp>
+      <p:pic>
+        <p:nvPicPr>
+          <p:cNvPr id="2" name="Picture 1"/>
+          <p:cNvPicPr>
+            <a:picLocks noChangeAspect="1"/>
+          </p:cNvPicPr>
+          <p:nvPr/>
+        </p:nvPicPr>
+        <p:blipFill>
+          <a:blip r:embed="rId3">
+            <a:extLst>
+              <a:ext uri="{28A0092B-C50C-407E-A947-70E740481C1C}">
+                <a14:useLocalDpi xmlns:a14="http://schemas.microsoft.com/office/drawing/2010/main" val="0"/>
+              </a:ext>
+            </a:extLst>
+          </a:blip>
+          <a:stretch>
+            <a:fillRect/>
+          </a:stretch>
+        </p:blipFill>
+        <p:spPr>
+          <a:xfrm>
             <a:off x="1547664" y="1059582"/>
             <a:ext cx="4766017" cy="3953898"/>
           </a:xfrm>
@@ -5699,7 +6725,7 @@
 </p:sld>
 </file>
 
-<file path=ppt/slides/slide16.xml><?xml version="1.0" encoding="utf-8"?>
+<file path=ppt/slides/slide19.xml><?xml version="1.0" encoding="utf-8"?>
 <p:sld xmlns:a="http://schemas.openxmlformats.org/drawingml/2006/main" xmlns:r="http://schemas.openxmlformats.org/officeDocument/2006/relationships" xmlns:p="http://schemas.openxmlformats.org/presentationml/2006/main">
   <p:cSld>
     <p:spTree>
@@ -5911,498 +6937,6 @@
                 </a:solidFill>
               </a:rPr>
               <a:t>Calculer le pourcentage de fichiers %FR qui inclue au moins un renommage.</a:t>
-            </a:r>
-          </a:p>
-        </p:txBody>
-      </p:sp>
-    </p:spTree>
-  </p:cSld>
-  <p:clrMapOvr>
-    <a:masterClrMapping/>
-  </p:clrMapOvr>
-  <p:transition spd="slow">
-    <p:cut/>
-  </p:transition>
-  <p:timing>
-    <p:tnLst>
-      <p:par>
-        <p:cTn id="1" dur="indefinite" restart="never" nodeType="tmRoot"/>
-      </p:par>
-    </p:tnLst>
-  </p:timing>
-</p:sld>
-</file>
-
-<file path=ppt/slides/slide17.xml><?xml version="1.0" encoding="utf-8"?>
-<p:sld xmlns:a="http://schemas.openxmlformats.org/drawingml/2006/main" xmlns:r="http://schemas.openxmlformats.org/officeDocument/2006/relationships" xmlns:p="http://schemas.openxmlformats.org/presentationml/2006/main">
-  <p:cSld>
-    <p:spTree>
-      <p:nvGrpSpPr>
-        <p:cNvPr id="1" name="Shape 102"/>
-        <p:cNvGrpSpPr/>
-        <p:nvPr/>
-      </p:nvGrpSpPr>
-      <p:grpSpPr>
-        <a:xfrm>
-          <a:off x="0" y="0"/>
-          <a:ext cx="0" cy="0"/>
-          <a:chOff x="0" y="0"/>
-          <a:chExt cx="0" cy="0"/>
-        </a:xfrm>
-      </p:grpSpPr>
-      <p:sp>
-        <p:nvSpPr>
-          <p:cNvPr id="103" name="Shape 103"/>
-          <p:cNvSpPr txBox="1">
-            <a:spLocks noGrp="1"/>
-          </p:cNvSpPr>
-          <p:nvPr>
-            <p:ph type="title"/>
-          </p:nvPr>
-        </p:nvSpPr>
-        <p:spPr>
-          <a:xfrm>
-            <a:off x="457200" y="205978"/>
-            <a:ext cx="8229600" cy="857400"/>
-          </a:xfrm>
-          <a:prstGeom prst="rect">
-            <a:avLst/>
-          </a:prstGeom>
-        </p:spPr>
-        <p:txBody>
-          <a:bodyPr lIns="91425" tIns="91425" rIns="91425" bIns="91425" anchor="ctr" anchorCtr="0">
-            <a:noAutofit/>
-          </a:bodyPr>
-          <a:lstStyle/>
-          <a:p>
-            <a:pPr lvl="0"/>
-            <a:r>
-              <a:rPr lang="fr" dirty="0"/>
-              <a:t>Méthodologie, </a:t>
-            </a:r>
-            <a:r>
-              <a:rPr lang="fr" sz="1400" dirty="0">
-                <a:solidFill>
-                  <a:schemeClr val="bg2"/>
-                </a:solidFill>
-              </a:rPr>
-              <a:t>première expérience</a:t>
-            </a:r>
-          </a:p>
-        </p:txBody>
-      </p:sp>
-      <p:sp>
-        <p:nvSpPr>
-          <p:cNvPr id="104" name="Shape 104"/>
-          <p:cNvSpPr txBox="1"/>
-          <p:nvPr/>
-        </p:nvSpPr>
-        <p:spPr>
-          <a:xfrm>
-            <a:off x="642000" y="1253900"/>
-            <a:ext cx="7859999" cy="3632400"/>
-          </a:xfrm>
-          <a:prstGeom prst="rect">
-            <a:avLst/>
-          </a:prstGeom>
-        </p:spPr>
-        <p:txBody>
-          <a:bodyPr lIns="91425" tIns="91425" rIns="91425" bIns="91425" anchor="t" anchorCtr="0">
-            <a:noAutofit/>
-          </a:bodyPr>
-          <a:lstStyle/>
-          <a:p>
-            <a:pPr marL="419100" lvl="0" indent="-342900" rtl="0">
-              <a:spcBef>
-                <a:spcPts val="0"/>
-              </a:spcBef>
-              <a:buClr>
-                <a:srgbClr val="000000"/>
-              </a:buClr>
-              <a:buSzPct val="100000"/>
-              <a:buFont typeface="+mj-lt"/>
-              <a:buAutoNum type="arabicPeriod"/>
-            </a:pPr>
-            <a:r>
-              <a:rPr lang="fr" sz="1800" dirty="0" smtClean="0">
-                <a:solidFill>
-                  <a:schemeClr val="tx2"/>
-                </a:solidFill>
-              </a:rPr>
-              <a:t>Lister </a:t>
-            </a:r>
-            <a:r>
-              <a:rPr lang="fr" sz="1800" dirty="0">
-                <a:solidFill>
-                  <a:schemeClr val="tx2"/>
-                </a:solidFill>
-              </a:rPr>
-              <a:t>les fichiers existant à la fin de la période</a:t>
-            </a:r>
-            <a:r>
-              <a:rPr lang="fr" sz="1800" dirty="0" smtClean="0">
-                <a:solidFill>
-                  <a:schemeClr val="tx2"/>
-                </a:solidFill>
-              </a:rPr>
-              <a:t>.</a:t>
-            </a:r>
-            <a:br>
-              <a:rPr lang="fr" sz="1800" dirty="0" smtClean="0">
-                <a:solidFill>
-                  <a:schemeClr val="tx2"/>
-                </a:solidFill>
-              </a:rPr>
-            </a:br>
-            <a:endParaRPr lang="fr" sz="1800" dirty="0">
-              <a:solidFill>
-                <a:schemeClr val="tx2"/>
-              </a:solidFill>
-            </a:endParaRPr>
-          </a:p>
-          <a:p>
-            <a:pPr marL="419100" lvl="0" indent="-342900" rtl="0">
-              <a:spcBef>
-                <a:spcPts val="0"/>
-              </a:spcBef>
-              <a:buClr>
-                <a:srgbClr val="000000"/>
-              </a:buClr>
-              <a:buSzPct val="100000"/>
-              <a:buFont typeface="+mj-lt"/>
-              <a:buAutoNum type="arabicPeriod"/>
-            </a:pPr>
-            <a:r>
-              <a:rPr lang="fr" sz="1800" dirty="0"/>
-              <a:t>Pour chacun de ces fichiers, extraire sa séquence de modifications durant la période en activant la détection de renommage (commande git log -M).</a:t>
-            </a:r>
-          </a:p>
-        </p:txBody>
-      </p:sp>
-      <p:pic>
-        <p:nvPicPr>
-          <p:cNvPr id="4" name="Shape 110"/>
-          <p:cNvPicPr preferRelativeResize="0"/>
-          <p:nvPr/>
-        </p:nvPicPr>
-        <p:blipFill>
-          <a:blip r:embed="rId3"/>
-          <a:stretch>
-            <a:fillRect/>
-          </a:stretch>
-        </p:blipFill>
-        <p:spPr>
-          <a:xfrm>
-            <a:off x="1977931" y="2859782"/>
-            <a:ext cx="5188136" cy="1872208"/>
-          </a:xfrm>
-          <a:prstGeom prst="rect">
-            <a:avLst/>
-          </a:prstGeom>
-          <a:noFill/>
-          <a:ln>
-            <a:noFill/>
-          </a:ln>
-        </p:spPr>
-      </p:pic>
-    </p:spTree>
-  </p:cSld>
-  <p:clrMapOvr>
-    <a:masterClrMapping/>
-  </p:clrMapOvr>
-  <p:transition spd="slow">
-    <p:cut/>
-  </p:transition>
-  <p:timing>
-    <p:tnLst>
-      <p:par>
-        <p:cTn id="1" dur="indefinite" restart="never" nodeType="tmRoot"/>
-      </p:par>
-    </p:tnLst>
-  </p:timing>
-</p:sld>
-</file>
-
-<file path=ppt/slides/slide18.xml><?xml version="1.0" encoding="utf-8"?>
-<p:sld xmlns:a="http://schemas.openxmlformats.org/drawingml/2006/main" xmlns:r="http://schemas.openxmlformats.org/officeDocument/2006/relationships" xmlns:p="http://schemas.openxmlformats.org/presentationml/2006/main">
-  <p:cSld>
-    <p:spTree>
-      <p:nvGrpSpPr>
-        <p:cNvPr id="1" name="Shape 114"/>
-        <p:cNvGrpSpPr/>
-        <p:nvPr/>
-      </p:nvGrpSpPr>
-      <p:grpSpPr>
-        <a:xfrm>
-          <a:off x="0" y="0"/>
-          <a:ext cx="0" cy="0"/>
-          <a:chOff x="0" y="0"/>
-          <a:chExt cx="0" cy="0"/>
-        </a:xfrm>
-      </p:grpSpPr>
-      <p:sp>
-        <p:nvSpPr>
-          <p:cNvPr id="115" name="Shape 115"/>
-          <p:cNvSpPr txBox="1">
-            <a:spLocks noGrp="1"/>
-          </p:cNvSpPr>
-          <p:nvPr>
-            <p:ph type="title"/>
-          </p:nvPr>
-        </p:nvSpPr>
-        <p:spPr>
-          <a:xfrm>
-            <a:off x="457200" y="205978"/>
-            <a:ext cx="8229600" cy="857400"/>
-          </a:xfrm>
-          <a:prstGeom prst="rect">
-            <a:avLst/>
-          </a:prstGeom>
-        </p:spPr>
-        <p:txBody>
-          <a:bodyPr lIns="91425" tIns="91425" rIns="91425" bIns="91425" anchor="ctr" anchorCtr="0">
-            <a:noAutofit/>
-          </a:bodyPr>
-          <a:lstStyle/>
-          <a:p>
-            <a:r>
-              <a:rPr lang="fr" dirty="0"/>
-              <a:t>Méthodologie, </a:t>
-            </a:r>
-            <a:r>
-              <a:rPr lang="fr" sz="1400" dirty="0">
-                <a:solidFill>
-                  <a:schemeClr val="bg2"/>
-                </a:solidFill>
-              </a:rPr>
-              <a:t>première expérience</a:t>
-            </a:r>
-          </a:p>
-        </p:txBody>
-      </p:sp>
-      <p:sp>
-        <p:nvSpPr>
-          <p:cNvPr id="116" name="Shape 116"/>
-          <p:cNvSpPr txBox="1"/>
-          <p:nvPr/>
-        </p:nvSpPr>
-        <p:spPr>
-          <a:xfrm>
-            <a:off x="642000" y="1253900"/>
-            <a:ext cx="7859999" cy="3632400"/>
-          </a:xfrm>
-          <a:prstGeom prst="rect">
-            <a:avLst/>
-          </a:prstGeom>
-        </p:spPr>
-        <p:txBody>
-          <a:bodyPr lIns="91425" tIns="91425" rIns="91425" bIns="91425" anchor="t" anchorCtr="0">
-            <a:noAutofit/>
-          </a:bodyPr>
-          <a:lstStyle/>
-          <a:p>
-            <a:pPr marL="457200" lvl="0" indent="-381000" rtl="0">
-              <a:spcBef>
-                <a:spcPts val="0"/>
-              </a:spcBef>
-              <a:buClr>
-                <a:srgbClr val="000000"/>
-              </a:buClr>
-              <a:buSzPct val="100000"/>
-              <a:buFont typeface="Arial"/>
-              <a:buAutoNum type="arabicPeriod"/>
-            </a:pPr>
-            <a:r>
-              <a:rPr lang="fr" sz="1800" dirty="0">
-                <a:solidFill>
-                  <a:schemeClr val="tx2"/>
-                </a:solidFill>
-              </a:rPr>
-              <a:t>Lister les fichiers existant à la fin de la période</a:t>
-            </a:r>
-            <a:r>
-              <a:rPr lang="fr" sz="1800" dirty="0" smtClean="0">
-                <a:solidFill>
-                  <a:schemeClr val="tx2"/>
-                </a:solidFill>
-              </a:rPr>
-              <a:t>.</a:t>
-            </a:r>
-            <a:br>
-              <a:rPr lang="fr" sz="1800" dirty="0" smtClean="0">
-                <a:solidFill>
-                  <a:schemeClr val="tx2"/>
-                </a:solidFill>
-              </a:rPr>
-            </a:br>
-            <a:endParaRPr lang="fr" sz="1800" dirty="0">
-              <a:solidFill>
-                <a:schemeClr val="tx2"/>
-              </a:solidFill>
-            </a:endParaRPr>
-          </a:p>
-          <a:p>
-            <a:pPr marL="457200" lvl="0" indent="-381000" rtl="0">
-              <a:spcBef>
-                <a:spcPts val="0"/>
-              </a:spcBef>
-              <a:buClr>
-                <a:srgbClr val="000000"/>
-              </a:buClr>
-              <a:buSzPct val="100000"/>
-              <a:buFont typeface="Arial"/>
-              <a:buAutoNum type="arabicPeriod"/>
-            </a:pPr>
-            <a:r>
-              <a:rPr lang="fr" sz="1800" dirty="0">
-                <a:solidFill>
-                  <a:schemeClr val="tx2"/>
-                </a:solidFill>
-              </a:rPr>
-              <a:t>Pour chacun de ces fichiers, extraire sa séquence de modifications durant la période en activant la détection de renommage (commande git log -M</a:t>
-            </a:r>
-            <a:r>
-              <a:rPr lang="fr" sz="1800" dirty="0" smtClean="0">
-                <a:solidFill>
-                  <a:schemeClr val="tx2"/>
-                </a:solidFill>
-              </a:rPr>
-              <a:t>).</a:t>
-            </a:r>
-            <a:r>
-              <a:rPr lang="fr" sz="1800" dirty="0" smtClean="0"/>
-              <a:t/>
-            </a:r>
-            <a:br>
-              <a:rPr lang="fr" sz="1800" dirty="0" smtClean="0"/>
-            </a:br>
-            <a:endParaRPr lang="fr" sz="1800" dirty="0"/>
-          </a:p>
-          <a:p>
-            <a:pPr marL="457200" lvl="0" indent="-381000" rtl="0">
-              <a:spcBef>
-                <a:spcPts val="0"/>
-              </a:spcBef>
-              <a:buClr>
-                <a:srgbClr val="000000"/>
-              </a:buClr>
-              <a:buSzPct val="100000"/>
-              <a:buFont typeface="Arial"/>
-              <a:buAutoNum type="arabicPeriod"/>
-            </a:pPr>
-            <a:r>
-              <a:rPr lang="fr" sz="1800" dirty="0"/>
-              <a:t>Calculer le pourcentage de fichiers %FR qui inclue au moins un renommage.</a:t>
-            </a:r>
-          </a:p>
-        </p:txBody>
-      </p:sp>
-    </p:spTree>
-  </p:cSld>
-  <p:clrMapOvr>
-    <a:masterClrMapping/>
-  </p:clrMapOvr>
-  <p:transition spd="slow">
-    <p:cut/>
-  </p:transition>
-  <p:timing>
-    <p:tnLst>
-      <p:par>
-        <p:cTn id="1" dur="indefinite" restart="never" nodeType="tmRoot"/>
-      </p:par>
-    </p:tnLst>
-  </p:timing>
-</p:sld>
-</file>
-
-<file path=ppt/slides/slide19.xml><?xml version="1.0" encoding="utf-8"?>
-<p:sld xmlns:a="http://schemas.openxmlformats.org/drawingml/2006/main" xmlns:r="http://schemas.openxmlformats.org/officeDocument/2006/relationships" xmlns:p="http://schemas.openxmlformats.org/presentationml/2006/main">
-  <p:cSld>
-    <p:spTree>
-      <p:nvGrpSpPr>
-        <p:cNvPr id="1" name="Shape 120"/>
-        <p:cNvGrpSpPr/>
-        <p:nvPr/>
-      </p:nvGrpSpPr>
-      <p:grpSpPr>
-        <a:xfrm>
-          <a:off x="0" y="0"/>
-          <a:ext cx="0" cy="0"/>
-          <a:chOff x="0" y="0"/>
-          <a:chExt cx="0" cy="0"/>
-        </a:xfrm>
-      </p:grpSpPr>
-      <p:sp>
-        <p:nvSpPr>
-          <p:cNvPr id="121" name="Shape 121"/>
-          <p:cNvSpPr txBox="1">
-            <a:spLocks noGrp="1"/>
-          </p:cNvSpPr>
-          <p:nvPr>
-            <p:ph type="title"/>
-          </p:nvPr>
-        </p:nvSpPr>
-        <p:spPr>
-          <a:xfrm>
-            <a:off x="457200" y="205978"/>
-            <a:ext cx="8229600" cy="857400"/>
-          </a:xfrm>
-          <a:prstGeom prst="rect">
-            <a:avLst/>
-          </a:prstGeom>
-        </p:spPr>
-        <p:txBody>
-          <a:bodyPr lIns="91425" tIns="91425" rIns="91425" bIns="91425" anchor="ctr" anchorCtr="0">
-            <a:noAutofit/>
-          </a:bodyPr>
-          <a:lstStyle/>
-          <a:p>
-            <a:pPr lvl="0"/>
-            <a:r>
-              <a:rPr lang="fr" dirty="0" smtClean="0"/>
-              <a:t>Méthodologie </a:t>
-            </a:r>
-            <a:r>
-              <a:rPr lang="fr" sz="1400" dirty="0">
-                <a:solidFill>
-                  <a:schemeClr val="bg2"/>
-                </a:solidFill>
-              </a:rPr>
-              <a:t>deuxième expérience</a:t>
-            </a:r>
-          </a:p>
-        </p:txBody>
-      </p:sp>
-      <p:sp>
-        <p:nvSpPr>
-          <p:cNvPr id="122" name="Shape 122"/>
-          <p:cNvSpPr txBox="1"/>
-          <p:nvPr/>
-        </p:nvSpPr>
-        <p:spPr>
-          <a:xfrm>
-            <a:off x="619125" y="1144300"/>
-            <a:ext cx="7922699" cy="3750000"/>
-          </a:xfrm>
-          <a:prstGeom prst="rect">
-            <a:avLst/>
-          </a:prstGeom>
-        </p:spPr>
-        <p:txBody>
-          <a:bodyPr lIns="91425" tIns="91425" rIns="91425" bIns="91425" anchor="t" anchorCtr="0">
-            <a:noAutofit/>
-          </a:bodyPr>
-          <a:lstStyle/>
-          <a:p>
-            <a:pPr lvl="0" rtl="0">
-              <a:spcBef>
-                <a:spcPts val="0"/>
-              </a:spcBef>
-              <a:buNone/>
-            </a:pPr>
-            <a:r>
-              <a:rPr lang="fr"/>
-              <a:t>Spearman</a:t>
             </a:r>
           </a:p>
         </p:txBody>
@@ -6568,6 +7102,498 @@
   <p:cSld>
     <p:spTree>
       <p:nvGrpSpPr>
+        <p:cNvPr id="1" name="Shape 102"/>
+        <p:cNvGrpSpPr/>
+        <p:nvPr/>
+      </p:nvGrpSpPr>
+      <p:grpSpPr>
+        <a:xfrm>
+          <a:off x="0" y="0"/>
+          <a:ext cx="0" cy="0"/>
+          <a:chOff x="0" y="0"/>
+          <a:chExt cx="0" cy="0"/>
+        </a:xfrm>
+      </p:grpSpPr>
+      <p:sp>
+        <p:nvSpPr>
+          <p:cNvPr id="103" name="Shape 103"/>
+          <p:cNvSpPr txBox="1">
+            <a:spLocks noGrp="1"/>
+          </p:cNvSpPr>
+          <p:nvPr>
+            <p:ph type="title"/>
+          </p:nvPr>
+        </p:nvSpPr>
+        <p:spPr>
+          <a:xfrm>
+            <a:off x="457200" y="205978"/>
+            <a:ext cx="8229600" cy="857400"/>
+          </a:xfrm>
+          <a:prstGeom prst="rect">
+            <a:avLst/>
+          </a:prstGeom>
+        </p:spPr>
+        <p:txBody>
+          <a:bodyPr lIns="91425" tIns="91425" rIns="91425" bIns="91425" anchor="ctr" anchorCtr="0">
+            <a:noAutofit/>
+          </a:bodyPr>
+          <a:lstStyle/>
+          <a:p>
+            <a:pPr lvl="0"/>
+            <a:r>
+              <a:rPr lang="fr" dirty="0"/>
+              <a:t>Méthodologie, </a:t>
+            </a:r>
+            <a:r>
+              <a:rPr lang="fr" sz="1400" dirty="0">
+                <a:solidFill>
+                  <a:schemeClr val="bg2"/>
+                </a:solidFill>
+              </a:rPr>
+              <a:t>première expérience</a:t>
+            </a:r>
+          </a:p>
+        </p:txBody>
+      </p:sp>
+      <p:sp>
+        <p:nvSpPr>
+          <p:cNvPr id="104" name="Shape 104"/>
+          <p:cNvSpPr txBox="1"/>
+          <p:nvPr/>
+        </p:nvSpPr>
+        <p:spPr>
+          <a:xfrm>
+            <a:off x="642000" y="1253900"/>
+            <a:ext cx="7859999" cy="3632400"/>
+          </a:xfrm>
+          <a:prstGeom prst="rect">
+            <a:avLst/>
+          </a:prstGeom>
+        </p:spPr>
+        <p:txBody>
+          <a:bodyPr lIns="91425" tIns="91425" rIns="91425" bIns="91425" anchor="t" anchorCtr="0">
+            <a:noAutofit/>
+          </a:bodyPr>
+          <a:lstStyle/>
+          <a:p>
+            <a:pPr marL="419100" lvl="0" indent="-342900" rtl="0">
+              <a:spcBef>
+                <a:spcPts val="0"/>
+              </a:spcBef>
+              <a:buClr>
+                <a:srgbClr val="000000"/>
+              </a:buClr>
+              <a:buSzPct val="100000"/>
+              <a:buFont typeface="+mj-lt"/>
+              <a:buAutoNum type="arabicPeriod"/>
+            </a:pPr>
+            <a:r>
+              <a:rPr lang="fr" sz="1800" dirty="0" smtClean="0">
+                <a:solidFill>
+                  <a:schemeClr val="tx2"/>
+                </a:solidFill>
+              </a:rPr>
+              <a:t>Lister </a:t>
+            </a:r>
+            <a:r>
+              <a:rPr lang="fr" sz="1800" dirty="0">
+                <a:solidFill>
+                  <a:schemeClr val="tx2"/>
+                </a:solidFill>
+              </a:rPr>
+              <a:t>les fichiers existant à la fin de la période</a:t>
+            </a:r>
+            <a:r>
+              <a:rPr lang="fr" sz="1800" dirty="0" smtClean="0">
+                <a:solidFill>
+                  <a:schemeClr val="tx2"/>
+                </a:solidFill>
+              </a:rPr>
+              <a:t>.</a:t>
+            </a:r>
+            <a:br>
+              <a:rPr lang="fr" sz="1800" dirty="0" smtClean="0">
+                <a:solidFill>
+                  <a:schemeClr val="tx2"/>
+                </a:solidFill>
+              </a:rPr>
+            </a:br>
+            <a:endParaRPr lang="fr" sz="1800" dirty="0">
+              <a:solidFill>
+                <a:schemeClr val="tx2"/>
+              </a:solidFill>
+            </a:endParaRPr>
+          </a:p>
+          <a:p>
+            <a:pPr marL="419100" lvl="0" indent="-342900" rtl="0">
+              <a:spcBef>
+                <a:spcPts val="0"/>
+              </a:spcBef>
+              <a:buClr>
+                <a:srgbClr val="000000"/>
+              </a:buClr>
+              <a:buSzPct val="100000"/>
+              <a:buFont typeface="+mj-lt"/>
+              <a:buAutoNum type="arabicPeriod"/>
+            </a:pPr>
+            <a:r>
+              <a:rPr lang="fr" sz="1800" dirty="0"/>
+              <a:t>Pour chacun de ces fichiers, extraire sa séquence de modifications durant la période en activant la détection de renommage (commande git log -M).</a:t>
+            </a:r>
+          </a:p>
+        </p:txBody>
+      </p:sp>
+      <p:pic>
+        <p:nvPicPr>
+          <p:cNvPr id="4" name="Shape 110"/>
+          <p:cNvPicPr preferRelativeResize="0"/>
+          <p:nvPr/>
+        </p:nvPicPr>
+        <p:blipFill>
+          <a:blip r:embed="rId3"/>
+          <a:stretch>
+            <a:fillRect/>
+          </a:stretch>
+        </p:blipFill>
+        <p:spPr>
+          <a:xfrm>
+            <a:off x="1977931" y="2859782"/>
+            <a:ext cx="5188136" cy="1872208"/>
+          </a:xfrm>
+          <a:prstGeom prst="rect">
+            <a:avLst/>
+          </a:prstGeom>
+          <a:noFill/>
+          <a:ln>
+            <a:noFill/>
+          </a:ln>
+        </p:spPr>
+      </p:pic>
+    </p:spTree>
+  </p:cSld>
+  <p:clrMapOvr>
+    <a:masterClrMapping/>
+  </p:clrMapOvr>
+  <p:transition spd="slow">
+    <p:cut/>
+  </p:transition>
+  <p:timing>
+    <p:tnLst>
+      <p:par>
+        <p:cTn id="1" dur="indefinite" restart="never" nodeType="tmRoot"/>
+      </p:par>
+    </p:tnLst>
+  </p:timing>
+</p:sld>
+</file>
+
+<file path=ppt/slides/slide21.xml><?xml version="1.0" encoding="utf-8"?>
+<p:sld xmlns:a="http://schemas.openxmlformats.org/drawingml/2006/main" xmlns:r="http://schemas.openxmlformats.org/officeDocument/2006/relationships" xmlns:p="http://schemas.openxmlformats.org/presentationml/2006/main">
+  <p:cSld>
+    <p:spTree>
+      <p:nvGrpSpPr>
+        <p:cNvPr id="1" name="Shape 114"/>
+        <p:cNvGrpSpPr/>
+        <p:nvPr/>
+      </p:nvGrpSpPr>
+      <p:grpSpPr>
+        <a:xfrm>
+          <a:off x="0" y="0"/>
+          <a:ext cx="0" cy="0"/>
+          <a:chOff x="0" y="0"/>
+          <a:chExt cx="0" cy="0"/>
+        </a:xfrm>
+      </p:grpSpPr>
+      <p:sp>
+        <p:nvSpPr>
+          <p:cNvPr id="115" name="Shape 115"/>
+          <p:cNvSpPr txBox="1">
+            <a:spLocks noGrp="1"/>
+          </p:cNvSpPr>
+          <p:nvPr>
+            <p:ph type="title"/>
+          </p:nvPr>
+        </p:nvSpPr>
+        <p:spPr>
+          <a:xfrm>
+            <a:off x="457200" y="205978"/>
+            <a:ext cx="8229600" cy="857400"/>
+          </a:xfrm>
+          <a:prstGeom prst="rect">
+            <a:avLst/>
+          </a:prstGeom>
+        </p:spPr>
+        <p:txBody>
+          <a:bodyPr lIns="91425" tIns="91425" rIns="91425" bIns="91425" anchor="ctr" anchorCtr="0">
+            <a:noAutofit/>
+          </a:bodyPr>
+          <a:lstStyle/>
+          <a:p>
+            <a:r>
+              <a:rPr lang="fr" dirty="0"/>
+              <a:t>Méthodologie, </a:t>
+            </a:r>
+            <a:r>
+              <a:rPr lang="fr" sz="1400" dirty="0">
+                <a:solidFill>
+                  <a:schemeClr val="bg2"/>
+                </a:solidFill>
+              </a:rPr>
+              <a:t>première expérience</a:t>
+            </a:r>
+          </a:p>
+        </p:txBody>
+      </p:sp>
+      <p:sp>
+        <p:nvSpPr>
+          <p:cNvPr id="116" name="Shape 116"/>
+          <p:cNvSpPr txBox="1"/>
+          <p:nvPr/>
+        </p:nvSpPr>
+        <p:spPr>
+          <a:xfrm>
+            <a:off x="642000" y="1253900"/>
+            <a:ext cx="7859999" cy="3632400"/>
+          </a:xfrm>
+          <a:prstGeom prst="rect">
+            <a:avLst/>
+          </a:prstGeom>
+        </p:spPr>
+        <p:txBody>
+          <a:bodyPr lIns="91425" tIns="91425" rIns="91425" bIns="91425" anchor="t" anchorCtr="0">
+            <a:noAutofit/>
+          </a:bodyPr>
+          <a:lstStyle/>
+          <a:p>
+            <a:pPr marL="457200" lvl="0" indent="-381000" rtl="0">
+              <a:spcBef>
+                <a:spcPts val="0"/>
+              </a:spcBef>
+              <a:buClr>
+                <a:srgbClr val="000000"/>
+              </a:buClr>
+              <a:buSzPct val="100000"/>
+              <a:buFont typeface="Arial"/>
+              <a:buAutoNum type="arabicPeriod"/>
+            </a:pPr>
+            <a:r>
+              <a:rPr lang="fr" sz="1800" dirty="0">
+                <a:solidFill>
+                  <a:schemeClr val="tx2"/>
+                </a:solidFill>
+              </a:rPr>
+              <a:t>Lister les fichiers existant à la fin de la période</a:t>
+            </a:r>
+            <a:r>
+              <a:rPr lang="fr" sz="1800" dirty="0" smtClean="0">
+                <a:solidFill>
+                  <a:schemeClr val="tx2"/>
+                </a:solidFill>
+              </a:rPr>
+              <a:t>.</a:t>
+            </a:r>
+            <a:br>
+              <a:rPr lang="fr" sz="1800" dirty="0" smtClean="0">
+                <a:solidFill>
+                  <a:schemeClr val="tx2"/>
+                </a:solidFill>
+              </a:rPr>
+            </a:br>
+            <a:endParaRPr lang="fr" sz="1800" dirty="0">
+              <a:solidFill>
+                <a:schemeClr val="tx2"/>
+              </a:solidFill>
+            </a:endParaRPr>
+          </a:p>
+          <a:p>
+            <a:pPr marL="457200" lvl="0" indent="-381000" rtl="0">
+              <a:spcBef>
+                <a:spcPts val="0"/>
+              </a:spcBef>
+              <a:buClr>
+                <a:srgbClr val="000000"/>
+              </a:buClr>
+              <a:buSzPct val="100000"/>
+              <a:buFont typeface="Arial"/>
+              <a:buAutoNum type="arabicPeriod"/>
+            </a:pPr>
+            <a:r>
+              <a:rPr lang="fr" sz="1800" dirty="0">
+                <a:solidFill>
+                  <a:schemeClr val="tx2"/>
+                </a:solidFill>
+              </a:rPr>
+              <a:t>Pour chacun de ces fichiers, extraire sa séquence de modifications durant la période en activant la détection de renommage (commande git log -M</a:t>
+            </a:r>
+            <a:r>
+              <a:rPr lang="fr" sz="1800" dirty="0" smtClean="0">
+                <a:solidFill>
+                  <a:schemeClr val="tx2"/>
+                </a:solidFill>
+              </a:rPr>
+              <a:t>).</a:t>
+            </a:r>
+            <a:r>
+              <a:rPr lang="fr" sz="1800" dirty="0" smtClean="0"/>
+              <a:t/>
+            </a:r>
+            <a:br>
+              <a:rPr lang="fr" sz="1800" dirty="0" smtClean="0"/>
+            </a:br>
+            <a:endParaRPr lang="fr" sz="1800" dirty="0"/>
+          </a:p>
+          <a:p>
+            <a:pPr marL="457200" lvl="0" indent="-381000" rtl="0">
+              <a:spcBef>
+                <a:spcPts val="0"/>
+              </a:spcBef>
+              <a:buClr>
+                <a:srgbClr val="000000"/>
+              </a:buClr>
+              <a:buSzPct val="100000"/>
+              <a:buFont typeface="Arial"/>
+              <a:buAutoNum type="arabicPeriod"/>
+            </a:pPr>
+            <a:r>
+              <a:rPr lang="fr" sz="1800" dirty="0"/>
+              <a:t>Calculer le pourcentage de fichiers %FR qui inclue au moins un renommage.</a:t>
+            </a:r>
+          </a:p>
+        </p:txBody>
+      </p:sp>
+    </p:spTree>
+  </p:cSld>
+  <p:clrMapOvr>
+    <a:masterClrMapping/>
+  </p:clrMapOvr>
+  <p:transition spd="slow">
+    <p:cut/>
+  </p:transition>
+  <p:timing>
+    <p:tnLst>
+      <p:par>
+        <p:cTn id="1" dur="indefinite" restart="never" nodeType="tmRoot"/>
+      </p:par>
+    </p:tnLst>
+  </p:timing>
+</p:sld>
+</file>
+
+<file path=ppt/slides/slide22.xml><?xml version="1.0" encoding="utf-8"?>
+<p:sld xmlns:a="http://schemas.openxmlformats.org/drawingml/2006/main" xmlns:r="http://schemas.openxmlformats.org/officeDocument/2006/relationships" xmlns:p="http://schemas.openxmlformats.org/presentationml/2006/main">
+  <p:cSld>
+    <p:spTree>
+      <p:nvGrpSpPr>
+        <p:cNvPr id="1" name="Shape 120"/>
+        <p:cNvGrpSpPr/>
+        <p:nvPr/>
+      </p:nvGrpSpPr>
+      <p:grpSpPr>
+        <a:xfrm>
+          <a:off x="0" y="0"/>
+          <a:ext cx="0" cy="0"/>
+          <a:chOff x="0" y="0"/>
+          <a:chExt cx="0" cy="0"/>
+        </a:xfrm>
+      </p:grpSpPr>
+      <p:sp>
+        <p:nvSpPr>
+          <p:cNvPr id="121" name="Shape 121"/>
+          <p:cNvSpPr txBox="1">
+            <a:spLocks noGrp="1"/>
+          </p:cNvSpPr>
+          <p:nvPr>
+            <p:ph type="title"/>
+          </p:nvPr>
+        </p:nvSpPr>
+        <p:spPr>
+          <a:xfrm>
+            <a:off x="457200" y="205978"/>
+            <a:ext cx="8229600" cy="857400"/>
+          </a:xfrm>
+          <a:prstGeom prst="rect">
+            <a:avLst/>
+          </a:prstGeom>
+        </p:spPr>
+        <p:txBody>
+          <a:bodyPr lIns="91425" tIns="91425" rIns="91425" bIns="91425" anchor="ctr" anchorCtr="0">
+            <a:noAutofit/>
+          </a:bodyPr>
+          <a:lstStyle/>
+          <a:p>
+            <a:pPr lvl="0"/>
+            <a:r>
+              <a:rPr lang="fr" dirty="0" smtClean="0"/>
+              <a:t>Méthodologie </a:t>
+            </a:r>
+            <a:r>
+              <a:rPr lang="fr" sz="1400" dirty="0">
+                <a:solidFill>
+                  <a:schemeClr val="bg2"/>
+                </a:solidFill>
+              </a:rPr>
+              <a:t>deuxième expérience</a:t>
+            </a:r>
+          </a:p>
+        </p:txBody>
+      </p:sp>
+      <p:sp>
+        <p:nvSpPr>
+          <p:cNvPr id="122" name="Shape 122"/>
+          <p:cNvSpPr txBox="1"/>
+          <p:nvPr/>
+        </p:nvSpPr>
+        <p:spPr>
+          <a:xfrm>
+            <a:off x="619125" y="1144300"/>
+            <a:ext cx="7922699" cy="3750000"/>
+          </a:xfrm>
+          <a:prstGeom prst="rect">
+            <a:avLst/>
+          </a:prstGeom>
+        </p:spPr>
+        <p:txBody>
+          <a:bodyPr lIns="91425" tIns="91425" rIns="91425" bIns="91425" anchor="t" anchorCtr="0">
+            <a:noAutofit/>
+          </a:bodyPr>
+          <a:lstStyle/>
+          <a:p>
+            <a:pPr lvl="0" rtl="0">
+              <a:spcBef>
+                <a:spcPts val="0"/>
+              </a:spcBef>
+              <a:buNone/>
+            </a:pPr>
+            <a:r>
+              <a:rPr lang="fr"/>
+              <a:t>Spearman</a:t>
+            </a:r>
+          </a:p>
+        </p:txBody>
+      </p:sp>
+    </p:spTree>
+  </p:cSld>
+  <p:clrMapOvr>
+    <a:masterClrMapping/>
+  </p:clrMapOvr>
+  <p:transition spd="slow">
+    <p:cut/>
+  </p:transition>
+  <p:timing>
+    <p:tnLst>
+      <p:par>
+        <p:cTn id="1" dur="indefinite" restart="never" nodeType="tmRoot"/>
+      </p:par>
+    </p:tnLst>
+  </p:timing>
+</p:sld>
+</file>
+
+<file path=ppt/slides/slide23.xml><?xml version="1.0" encoding="utf-8"?>
+<p:sld xmlns:a="http://schemas.openxmlformats.org/drawingml/2006/main" xmlns:r="http://schemas.openxmlformats.org/officeDocument/2006/relationships" xmlns:p="http://schemas.openxmlformats.org/presentationml/2006/main">
+  <p:cSld>
+    <p:spTree>
+      <p:nvGrpSpPr>
         <p:cNvPr id="1" name="Shape 126"/>
         <p:cNvGrpSpPr/>
         <p:nvPr/>
@@ -6689,7 +7715,7 @@
 </p:sld>
 </file>
 
-<file path=ppt/slides/slide21.xml><?xml version="1.0" encoding="utf-8"?>
+<file path=ppt/slides/slide24.xml><?xml version="1.0" encoding="utf-8"?>
 <p:sld xmlns:a="http://schemas.openxmlformats.org/drawingml/2006/main" xmlns:r="http://schemas.openxmlformats.org/officeDocument/2006/relationships" xmlns:p="http://schemas.openxmlformats.org/presentationml/2006/main">
   <p:cSld>
     <p:spTree>
@@ -6877,7 +7903,7 @@
 </p:sld>
 </file>
 
-<file path=ppt/slides/slide22.xml><?xml version="1.0" encoding="utf-8"?>
+<file path=ppt/slides/slide25.xml><?xml version="1.0" encoding="utf-8"?>
 <p:sld xmlns:a="http://schemas.openxmlformats.org/drawingml/2006/main" xmlns:r="http://schemas.openxmlformats.org/officeDocument/2006/relationships" xmlns:p="http://schemas.openxmlformats.org/presentationml/2006/main">
   <p:cSld>
     <p:spTree>
@@ -7026,7 +8052,7 @@
 </p:sld>
 </file>
 
-<file path=ppt/slides/slide23.xml><?xml version="1.0" encoding="utf-8"?>
+<file path=ppt/slides/slide26.xml><?xml version="1.0" encoding="utf-8"?>
 <p:sld xmlns:a="http://schemas.openxmlformats.org/drawingml/2006/main" xmlns:r="http://schemas.openxmlformats.org/officeDocument/2006/relationships" xmlns:p="http://schemas.openxmlformats.org/presentationml/2006/main">
   <p:cSld>
     <p:spTree>
@@ -7649,6 +8675,71 @@
   <p:cSld>
     <p:spTree>
       <p:nvGrpSpPr>
+        <p:cNvPr id="1" name=""/>
+        <p:cNvGrpSpPr/>
+        <p:nvPr/>
+      </p:nvGrpSpPr>
+      <p:grpSpPr>
+        <a:xfrm>
+          <a:off x="0" y="0"/>
+          <a:ext cx="0" cy="0"/>
+          <a:chOff x="0" y="0"/>
+          <a:chExt cx="0" cy="0"/>
+        </a:xfrm>
+      </p:grpSpPr>
+      <p:sp>
+        <p:nvSpPr>
+          <p:cNvPr id="2" name="Title 1"/>
+          <p:cNvSpPr>
+            <a:spLocks noGrp="1"/>
+          </p:cNvSpPr>
+          <p:nvPr>
+            <p:ph type="title"/>
+          </p:nvPr>
+        </p:nvSpPr>
+        <p:spPr/>
+        <p:txBody>
+          <a:bodyPr/>
+          <a:lstStyle/>
+          <a:p>
+            <a:r>
+              <a:rPr lang="fr" dirty="0"/>
+              <a:t>Contexte </a:t>
+            </a:r>
+            <a:r>
+              <a:rPr lang="fr" sz="1400" dirty="0" smtClean="0">
+                <a:solidFill>
+                  <a:schemeClr val="bg2"/>
+                </a:solidFill>
+              </a:rPr>
+              <a:t>l’historique d’un gestionnaire de versions (vcs)</a:t>
+            </a:r>
+            <a:endParaRPr lang="fr-FR" sz="1400" dirty="0">
+              <a:solidFill>
+                <a:schemeClr val="bg2"/>
+              </a:solidFill>
+            </a:endParaRPr>
+          </a:p>
+        </p:txBody>
+      </p:sp>
+    </p:spTree>
+    <p:extLst>
+      <p:ext uri="{BB962C8B-B14F-4D97-AF65-F5344CB8AC3E}">
+        <p14:creationId xmlns:p14="http://schemas.microsoft.com/office/powerpoint/2010/main" val="3752319002"/>
+      </p:ext>
+    </p:extLst>
+  </p:cSld>
+  <p:clrMapOvr>
+    <a:masterClrMapping/>
+  </p:clrMapOvr>
+</p:sld>
+</file>
+
+<file path=ppt/slides/slide6.xml><?xml version="1.0" encoding="utf-8"?>
+<p:sld xmlns:a="http://schemas.openxmlformats.org/drawingml/2006/main" xmlns:r="http://schemas.openxmlformats.org/officeDocument/2006/relationships" xmlns:p="http://schemas.openxmlformats.org/presentationml/2006/main">
+  <p:cSld>
+    <p:spTree>
+      <p:nvGrpSpPr>
         <p:cNvPr id="1" name="Shape 43"/>
         <p:cNvGrpSpPr/>
         <p:nvPr/>
@@ -7733,249 +8824,6 @@
           </a:ln>
         </p:spPr>
       </p:pic>
-      <p:sp>
-        <p:nvSpPr>
-          <p:cNvPr id="46" name="Shape 46"/>
-          <p:cNvSpPr txBox="1"/>
-          <p:nvPr/>
-        </p:nvSpPr>
-        <p:spPr>
-          <a:xfrm>
-            <a:off x="6341950" y="3860875"/>
-            <a:ext cx="2344799" cy="430500"/>
-          </a:xfrm>
-          <a:prstGeom prst="rect">
-            <a:avLst/>
-          </a:prstGeom>
-        </p:spPr>
-        <p:txBody>
-          <a:bodyPr lIns="91425" tIns="91425" rIns="91425" bIns="91425" anchor="t" anchorCtr="0">
-            <a:noAutofit/>
-          </a:bodyPr>
-          <a:lstStyle/>
-          <a:p>
-            <a:pPr>
-              <a:spcBef>
-                <a:spcPts val="0"/>
-              </a:spcBef>
-              <a:buNone/>
-            </a:pPr>
-            <a:r>
-              <a:rPr lang="fr"/>
-              <a:t>NoD = 1</a:t>
-            </a:r>
-          </a:p>
-        </p:txBody>
-      </p:sp>
-    </p:spTree>
-  </p:cSld>
-  <p:clrMapOvr>
-    <a:masterClrMapping/>
-  </p:clrMapOvr>
-  <p:transition spd="slow">
-    <p:cut/>
-  </p:transition>
-  <p:timing>
-    <p:tnLst>
-      <p:par>
-        <p:cTn id="1" dur="indefinite" restart="never" nodeType="tmRoot"/>
-      </p:par>
-    </p:tnLst>
-  </p:timing>
-</p:sld>
-</file>
-
-<file path=ppt/slides/slide6.xml><?xml version="1.0" encoding="utf-8"?>
-<p:sld xmlns:a="http://schemas.openxmlformats.org/drawingml/2006/main" xmlns:r="http://schemas.openxmlformats.org/officeDocument/2006/relationships" xmlns:p="http://schemas.openxmlformats.org/presentationml/2006/main">
-  <p:cSld>
-    <p:spTree>
-      <p:nvGrpSpPr>
-        <p:cNvPr id="1" name="Shape 50"/>
-        <p:cNvGrpSpPr/>
-        <p:nvPr/>
-      </p:nvGrpSpPr>
-      <p:grpSpPr>
-        <a:xfrm>
-          <a:off x="0" y="0"/>
-          <a:ext cx="0" cy="0"/>
-          <a:chOff x="0" y="0"/>
-          <a:chExt cx="0" cy="0"/>
-        </a:xfrm>
-      </p:grpSpPr>
-      <p:sp>
-        <p:nvSpPr>
-          <p:cNvPr id="51" name="Shape 51"/>
-          <p:cNvSpPr txBox="1">
-            <a:spLocks noGrp="1"/>
-          </p:cNvSpPr>
-          <p:nvPr>
-            <p:ph type="title"/>
-          </p:nvPr>
-        </p:nvSpPr>
-        <p:spPr>
-          <a:xfrm>
-            <a:off x="457200" y="205978"/>
-            <a:ext cx="8229600" cy="857400"/>
-          </a:xfrm>
-          <a:prstGeom prst="rect">
-            <a:avLst/>
-          </a:prstGeom>
-        </p:spPr>
-        <p:txBody>
-          <a:bodyPr lIns="91425" tIns="91425" rIns="91425" bIns="91425" anchor="ctr" anchorCtr="0">
-            <a:noAutofit/>
-          </a:bodyPr>
-          <a:lstStyle/>
-          <a:p>
-            <a:pPr lvl="0" rtl="0">
-              <a:spcBef>
-                <a:spcPts val="0"/>
-              </a:spcBef>
-              <a:buNone/>
-            </a:pPr>
-            <a:r>
-              <a:rPr lang="fr" dirty="0" smtClean="0"/>
-              <a:t>Contexte </a:t>
-            </a:r>
-            <a:r>
-              <a:rPr lang="fr" sz="1400" dirty="0">
-                <a:solidFill>
-                  <a:schemeClr val="bg2"/>
-                </a:solidFill>
-              </a:rPr>
-              <a:t>métriques et renommage</a:t>
-            </a:r>
-          </a:p>
-        </p:txBody>
-      </p:sp>
-      <p:pic>
-        <p:nvPicPr>
-          <p:cNvPr id="52" name="Shape 52"/>
-          <p:cNvPicPr preferRelativeResize="0"/>
-          <p:nvPr/>
-        </p:nvPicPr>
-        <p:blipFill>
-          <a:blip r:embed="rId3"/>
-          <a:stretch>
-            <a:fillRect/>
-          </a:stretch>
-        </p:blipFill>
-        <p:spPr>
-          <a:xfrm>
-            <a:off x="612125" y="1270475"/>
-            <a:ext cx="5009574" cy="3058849"/>
-          </a:xfrm>
-          <a:prstGeom prst="rect">
-            <a:avLst/>
-          </a:prstGeom>
-          <a:noFill/>
-          <a:ln>
-            <a:noFill/>
-          </a:ln>
-        </p:spPr>
-      </p:pic>
-      <p:sp>
-        <p:nvSpPr>
-          <p:cNvPr id="53" name="Shape 53"/>
-          <p:cNvSpPr txBox="1"/>
-          <p:nvPr/>
-        </p:nvSpPr>
-        <p:spPr>
-          <a:xfrm>
-            <a:off x="6658775" y="3735625"/>
-            <a:ext cx="1890899" cy="438299"/>
-          </a:xfrm>
-          <a:prstGeom prst="rect">
-            <a:avLst/>
-          </a:prstGeom>
-        </p:spPr>
-        <p:txBody>
-          <a:bodyPr lIns="91425" tIns="91425" rIns="91425" bIns="91425" anchor="t" anchorCtr="0">
-            <a:noAutofit/>
-          </a:bodyPr>
-          <a:lstStyle/>
-          <a:p>
-            <a:pPr>
-              <a:spcBef>
-                <a:spcPts val="0"/>
-              </a:spcBef>
-              <a:buNone/>
-            </a:pPr>
-            <a:r>
-              <a:rPr lang="fr"/>
-              <a:t>NoD =3</a:t>
-            </a:r>
-          </a:p>
-        </p:txBody>
-      </p:sp>
-      <p:sp>
-        <p:nvSpPr>
-          <p:cNvPr id="54" name="Shape 54"/>
-          <p:cNvSpPr txBox="1"/>
-          <p:nvPr/>
-        </p:nvSpPr>
-        <p:spPr>
-          <a:xfrm>
-            <a:off x="6658775" y="2635425"/>
-            <a:ext cx="1890899" cy="438299"/>
-          </a:xfrm>
-          <a:prstGeom prst="rect">
-            <a:avLst/>
-          </a:prstGeom>
-        </p:spPr>
-        <p:txBody>
-          <a:bodyPr lIns="91425" tIns="91425" rIns="91425" bIns="91425" anchor="t" anchorCtr="0">
-            <a:noAutofit/>
-          </a:bodyPr>
-          <a:lstStyle/>
-          <a:p>
-            <a:pPr lvl="0" rtl="0">
-              <a:spcBef>
-                <a:spcPts val="0"/>
-              </a:spcBef>
-              <a:buNone/>
-            </a:pPr>
-            <a:r>
-              <a:rPr lang="fr"/>
-              <a:t>NoD = 2</a:t>
-            </a:r>
-          </a:p>
-        </p:txBody>
-      </p:sp>
-      <p:sp>
-        <p:nvSpPr>
-          <p:cNvPr id="55" name="Shape 55"/>
-          <p:cNvSpPr txBox="1"/>
-          <p:nvPr/>
-        </p:nvSpPr>
-        <p:spPr>
-          <a:xfrm>
-            <a:off x="6658775" y="1535225"/>
-            <a:ext cx="1890899" cy="438299"/>
-          </a:xfrm>
-          <a:prstGeom prst="rect">
-            <a:avLst/>
-          </a:prstGeom>
-        </p:spPr>
-        <p:txBody>
-          <a:bodyPr lIns="91425" tIns="91425" rIns="91425" bIns="91425" anchor="t" anchorCtr="0">
-            <a:noAutofit/>
-          </a:bodyPr>
-          <a:lstStyle/>
-          <a:p>
-            <a:pPr lvl="0" rtl="0">
-              <a:spcBef>
-                <a:spcPts val="0"/>
-              </a:spcBef>
-              <a:buNone/>
-            </a:pPr>
-            <a:r>
-              <a:rPr lang="fr"/>
-              <a:t>NoD = 1</a:t>
-            </a:r>
-          </a:p>
-        </p:txBody>
-      </p:sp>
     </p:spTree>
   </p:cSld>
   <p:clrMapOvr>
@@ -7999,7 +8847,7 @@
   <p:cSld>
     <p:spTree>
       <p:nvGrpSpPr>
-        <p:cNvPr id="1" name="Shape 59"/>
+        <p:cNvPr id="1" name="Shape 43"/>
         <p:cNvGrpSpPr/>
         <p:nvPr/>
       </p:nvGrpSpPr>
@@ -8013,7 +8861,7 @@
       </p:grpSpPr>
       <p:sp>
         <p:nvSpPr>
-          <p:cNvPr id="60" name="Shape 60"/>
+          <p:cNvPr id="44" name="Shape 44"/>
           <p:cNvSpPr txBox="1">
             <a:spLocks noGrp="1"/>
           </p:cNvSpPr>
@@ -8031,12 +8879,12 @@
           </a:prstGeom>
         </p:spPr>
         <p:txBody>
-          <a:bodyPr lIns="91425" tIns="91425" rIns="91425" bIns="91425" anchor="b" anchorCtr="0">
+          <a:bodyPr lIns="91425" tIns="91425" rIns="91425" bIns="91425" anchor="ctr" anchorCtr="0">
             <a:noAutofit/>
           </a:bodyPr>
           <a:lstStyle/>
           <a:p>
-            <a:pPr lvl="0" rtl="0">
+            <a:pPr>
               <a:spcBef>
                 <a:spcPts val="0"/>
               </a:spcBef>
@@ -8047,24 +8895,19 @@
               <a:t>Contexte </a:t>
             </a:r>
             <a:r>
-              <a:rPr lang="fr" sz="1400" dirty="0" smtClean="0">
+              <a:rPr lang="fr" sz="1400" dirty="0">
                 <a:solidFill>
                   <a:schemeClr val="bg2"/>
                 </a:solidFill>
               </a:rPr>
-              <a:t>gestionnaires de versions</a:t>
-            </a:r>
-            <a:endParaRPr lang="fr" sz="1400" dirty="0">
-              <a:solidFill>
-                <a:schemeClr val="bg2"/>
-              </a:solidFill>
-            </a:endParaRPr>
+              <a:t>métriques et renommage</a:t>
+            </a:r>
           </a:p>
         </p:txBody>
       </p:sp>
       <p:pic>
         <p:nvPicPr>
-          <p:cNvPr id="61" name="Shape 61"/>
+          <p:cNvPr id="45" name="Shape 45"/>
           <p:cNvPicPr preferRelativeResize="0"/>
           <p:nvPr/>
         </p:nvPicPr>
@@ -8076,8 +8919,8 @@
         </p:blipFill>
         <p:spPr>
           <a:xfrm>
-            <a:off x="1331640" y="1386996"/>
-            <a:ext cx="5553175" cy="2939074"/>
+            <a:off x="612125" y="1270475"/>
+            <a:ext cx="5009574" cy="3058849"/>
           </a:xfrm>
           <a:prstGeom prst="rect">
             <a:avLst/>
@@ -8088,7 +8931,46 @@
           </a:ln>
         </p:spPr>
       </p:pic>
+      <p:sp>
+        <p:nvSpPr>
+          <p:cNvPr id="46" name="Shape 46"/>
+          <p:cNvSpPr txBox="1"/>
+          <p:nvPr/>
+        </p:nvSpPr>
+        <p:spPr>
+          <a:xfrm>
+            <a:off x="6341950" y="3860875"/>
+            <a:ext cx="2344799" cy="430500"/>
+          </a:xfrm>
+          <a:prstGeom prst="rect">
+            <a:avLst/>
+          </a:prstGeom>
+        </p:spPr>
+        <p:txBody>
+          <a:bodyPr lIns="91425" tIns="91425" rIns="91425" bIns="91425" anchor="t" anchorCtr="0">
+            <a:noAutofit/>
+          </a:bodyPr>
+          <a:lstStyle/>
+          <a:p>
+            <a:pPr>
+              <a:spcBef>
+                <a:spcPts val="0"/>
+              </a:spcBef>
+              <a:buNone/>
+            </a:pPr>
+            <a:r>
+              <a:rPr lang="fr"/>
+              <a:t>NoD = 1</a:t>
+            </a:r>
+          </a:p>
+        </p:txBody>
+      </p:sp>
     </p:spTree>
+    <p:extLst>
+      <p:ext uri="{BB962C8B-B14F-4D97-AF65-F5344CB8AC3E}">
+        <p14:creationId xmlns:p14="http://schemas.microsoft.com/office/powerpoint/2010/main" val="1308210117"/>
+      </p:ext>
+    </p:extLst>
   </p:cSld>
   <p:clrMapOvr>
     <a:masterClrMapping/>
@@ -8111,7 +8993,7 @@
   <p:cSld>
     <p:spTree>
       <p:nvGrpSpPr>
-        <p:cNvPr id="1" name="Shape 65"/>
+        <p:cNvPr id="1" name="Shape 50"/>
         <p:cNvGrpSpPr/>
         <p:nvPr/>
       </p:nvGrpSpPr>
@@ -8125,7 +9007,7 @@
       </p:grpSpPr>
       <p:sp>
         <p:nvSpPr>
-          <p:cNvPr id="66" name="Shape 66"/>
+          <p:cNvPr id="51" name="Shape 51"/>
           <p:cNvSpPr txBox="1">
             <a:spLocks noGrp="1"/>
           </p:cNvSpPr>
@@ -8143,7 +9025,7 @@
           </a:prstGeom>
         </p:spPr>
         <p:txBody>
-          <a:bodyPr lIns="91425" tIns="91425" rIns="91425" bIns="91425" anchor="b" anchorCtr="0">
+          <a:bodyPr lIns="91425" tIns="91425" rIns="91425" bIns="91425" anchor="ctr" anchorCtr="0">
             <a:noAutofit/>
           </a:bodyPr>
           <a:lstStyle/>
@@ -8164,26 +9046,27 @@
                   <a:schemeClr val="bg2"/>
                 </a:solidFill>
               </a:rPr>
-              <a:t>“Origin Analysis”</a:t>
+              <a:t>métriques et renommage</a:t>
             </a:r>
           </a:p>
         </p:txBody>
       </p:sp>
       <p:pic>
         <p:nvPicPr>
-          <p:cNvPr id="67" name="Shape 67"/>
+          <p:cNvPr id="52" name="Shape 52"/>
           <p:cNvPicPr preferRelativeResize="0"/>
           <p:nvPr/>
         </p:nvPicPr>
-        <p:blipFill rotWithShape="1">
+        <p:blipFill>
           <a:blip r:embed="rId3"/>
-          <a:srcRect b="31483"/>
-          <a:stretch/>
+          <a:stretch>
+            <a:fillRect/>
+          </a:stretch>
         </p:blipFill>
         <p:spPr>
           <a:xfrm>
-            <a:off x="1143000" y="1307400"/>
-            <a:ext cx="6858000" cy="3524250"/>
+            <a:off x="612125" y="1270475"/>
+            <a:ext cx="5009574" cy="3058849"/>
           </a:xfrm>
           <a:prstGeom prst="rect">
             <a:avLst/>
@@ -8194,6 +9077,108 @@
           </a:ln>
         </p:spPr>
       </p:pic>
+      <p:sp>
+        <p:nvSpPr>
+          <p:cNvPr id="53" name="Shape 53"/>
+          <p:cNvSpPr txBox="1"/>
+          <p:nvPr/>
+        </p:nvSpPr>
+        <p:spPr>
+          <a:xfrm>
+            <a:off x="6658775" y="3735625"/>
+            <a:ext cx="1890899" cy="438299"/>
+          </a:xfrm>
+          <a:prstGeom prst="rect">
+            <a:avLst/>
+          </a:prstGeom>
+        </p:spPr>
+        <p:txBody>
+          <a:bodyPr lIns="91425" tIns="91425" rIns="91425" bIns="91425" anchor="t" anchorCtr="0">
+            <a:noAutofit/>
+          </a:bodyPr>
+          <a:lstStyle/>
+          <a:p>
+            <a:pPr>
+              <a:spcBef>
+                <a:spcPts val="0"/>
+              </a:spcBef>
+              <a:buNone/>
+            </a:pPr>
+            <a:r>
+              <a:rPr lang="fr"/>
+              <a:t>NoD =3</a:t>
+            </a:r>
+          </a:p>
+        </p:txBody>
+      </p:sp>
+      <p:sp>
+        <p:nvSpPr>
+          <p:cNvPr id="54" name="Shape 54"/>
+          <p:cNvSpPr txBox="1"/>
+          <p:nvPr/>
+        </p:nvSpPr>
+        <p:spPr>
+          <a:xfrm>
+            <a:off x="6658775" y="2635425"/>
+            <a:ext cx="1890899" cy="438299"/>
+          </a:xfrm>
+          <a:prstGeom prst="rect">
+            <a:avLst/>
+          </a:prstGeom>
+        </p:spPr>
+        <p:txBody>
+          <a:bodyPr lIns="91425" tIns="91425" rIns="91425" bIns="91425" anchor="t" anchorCtr="0">
+            <a:noAutofit/>
+          </a:bodyPr>
+          <a:lstStyle/>
+          <a:p>
+            <a:pPr lvl="0" rtl="0">
+              <a:spcBef>
+                <a:spcPts val="0"/>
+              </a:spcBef>
+              <a:buNone/>
+            </a:pPr>
+            <a:r>
+              <a:rPr lang="fr"/>
+              <a:t>NoD = 2</a:t>
+            </a:r>
+          </a:p>
+        </p:txBody>
+      </p:sp>
+      <p:sp>
+        <p:nvSpPr>
+          <p:cNvPr id="55" name="Shape 55"/>
+          <p:cNvSpPr txBox="1"/>
+          <p:nvPr/>
+        </p:nvSpPr>
+        <p:spPr>
+          <a:xfrm>
+            <a:off x="6658775" y="1535225"/>
+            <a:ext cx="1890899" cy="438299"/>
+          </a:xfrm>
+          <a:prstGeom prst="rect">
+            <a:avLst/>
+          </a:prstGeom>
+        </p:spPr>
+        <p:txBody>
+          <a:bodyPr lIns="91425" tIns="91425" rIns="91425" bIns="91425" anchor="t" anchorCtr="0">
+            <a:noAutofit/>
+          </a:bodyPr>
+          <a:lstStyle/>
+          <a:p>
+            <a:pPr lvl="0" rtl="0">
+              <a:spcBef>
+                <a:spcPts val="0"/>
+              </a:spcBef>
+              <a:buNone/>
+            </a:pPr>
+            <a:r>
+              <a:rPr lang="fr"/>
+              <a:t>NoD = 1</a:t>
+            </a:r>
+          </a:p>
+        </p:txBody>
+      </p:sp>
     </p:spTree>
   </p:cSld>
   <p:clrMapOvr>
@@ -8217,7 +9202,7 @@
   <p:cSld>
     <p:spTree>
       <p:nvGrpSpPr>
-        <p:cNvPr id="1" name="Shape 71"/>
+        <p:cNvPr id="1" name="Shape 59"/>
         <p:cNvGrpSpPr/>
         <p:nvPr/>
       </p:nvGrpSpPr>
@@ -8231,7 +9216,7 @@
       </p:grpSpPr>
       <p:sp>
         <p:nvSpPr>
-          <p:cNvPr id="72" name="Shape 72"/>
+          <p:cNvPr id="60" name="Shape 60"/>
           <p:cNvSpPr txBox="1">
             <a:spLocks noGrp="1"/>
           </p:cNvSpPr>
@@ -8254,37 +9239,48 @@
           </a:bodyPr>
           <a:lstStyle/>
           <a:p>
-            <a:pPr lvl="0"/>
-            <a:r>
-              <a:rPr lang="fr" dirty="0"/>
+            <a:pPr lvl="0" rtl="0">
+              <a:spcBef>
+                <a:spcPts val="0"/>
+              </a:spcBef>
+              <a:buNone/>
+            </a:pPr>
+            <a:r>
+              <a:rPr lang="fr" dirty="0" smtClean="0"/>
               <a:t>Contexte </a:t>
             </a:r>
             <a:r>
-              <a:rPr lang="fr" sz="1400" dirty="0">
+              <a:rPr lang="fr" sz="1400" dirty="0" smtClean="0">
                 <a:solidFill>
                   <a:schemeClr val="bg2"/>
                 </a:solidFill>
               </a:rPr>
-              <a:t>“Origin Analysis”</a:t>
-            </a:r>
+              <a:t>gestionnaires de versions</a:t>
+            </a:r>
+            <a:endParaRPr lang="fr" sz="1400" dirty="0">
+              <a:solidFill>
+                <a:schemeClr val="bg2"/>
+              </a:solidFill>
+            </a:endParaRPr>
           </a:p>
         </p:txBody>
       </p:sp>
       <p:pic>
         <p:nvPicPr>
-          <p:cNvPr id="73" name="Shape 73"/>
+          <p:cNvPr id="61" name="Shape 61"/>
           <p:cNvPicPr preferRelativeResize="0"/>
           <p:nvPr/>
         </p:nvPicPr>
-        <p:blipFill rotWithShape="1">
+        <p:blipFill>
           <a:blip r:embed="rId3"/>
-          <a:srcRect b="32849"/>
-          <a:stretch/>
+          <a:stretch>
+            <a:fillRect/>
+          </a:stretch>
         </p:blipFill>
         <p:spPr>
           <a:xfrm>
-            <a:off x="1143000" y="1327225"/>
-            <a:ext cx="6858000" cy="3453800"/>
+            <a:off x="1331640" y="1386996"/>
+            <a:ext cx="5553175" cy="2939074"/>
           </a:xfrm>
           <a:prstGeom prst="rect">
             <a:avLst/>
@@ -8295,6 +9291,116 @@
           </a:ln>
         </p:spPr>
       </p:pic>
+      <p:sp>
+        <p:nvSpPr>
+          <p:cNvPr id="2" name="TextBox 1"/>
+          <p:cNvSpPr txBox="1"/>
+          <p:nvPr/>
+        </p:nvSpPr>
+        <p:spPr>
+          <a:xfrm>
+            <a:off x="3858072" y="2355725"/>
+            <a:ext cx="288032" cy="307777"/>
+          </a:xfrm>
+          <a:prstGeom prst="rect">
+            <a:avLst/>
+          </a:prstGeom>
+          <a:noFill/>
+        </p:spPr>
+        <p:txBody>
+          <a:bodyPr wrap="square" rtlCol="0">
+            <a:spAutoFit/>
+          </a:bodyPr>
+          <a:lstStyle/>
+          <a:p>
+            <a:r>
+              <a:rPr lang="fr-FR" dirty="0" smtClean="0"/>
+              <a:t>*</a:t>
+            </a:r>
+            <a:endParaRPr lang="fr-FR" dirty="0"/>
+          </a:p>
+        </p:txBody>
+      </p:sp>
+      <p:sp>
+        <p:nvSpPr>
+          <p:cNvPr id="3" name="TextBox 2"/>
+          <p:cNvSpPr txBox="1"/>
+          <p:nvPr/>
+        </p:nvSpPr>
+        <p:spPr>
+          <a:xfrm>
+            <a:off x="395536" y="4443958"/>
+            <a:ext cx="6489279" cy="461665"/>
+          </a:xfrm>
+          <a:prstGeom prst="rect">
+            <a:avLst/>
+          </a:prstGeom>
+          <a:noFill/>
+        </p:spPr>
+        <p:txBody>
+          <a:bodyPr wrap="square" rtlCol="0">
+            <a:spAutoFit/>
+          </a:bodyPr>
+          <a:lstStyle/>
+          <a:p>
+            <a:r>
+              <a:rPr lang="fr-FR" sz="1200" i="1" dirty="0" smtClean="0">
+                <a:solidFill>
+                  <a:schemeClr val="bg2"/>
+                </a:solidFill>
+              </a:rPr>
+              <a:t>* Kim et al,</a:t>
+            </a:r>
+          </a:p>
+          <a:p>
+            <a:r>
+              <a:rPr lang="fr-FR" sz="1200" i="1" dirty="0" smtClean="0">
+                <a:solidFill>
+                  <a:schemeClr val="bg2"/>
+                </a:solidFill>
+              </a:rPr>
+              <a:t> </a:t>
+            </a:r>
+            <a:r>
+              <a:rPr lang="en-US" sz="1200" i="1" dirty="0" smtClean="0">
+                <a:solidFill>
+                  <a:schemeClr val="bg2"/>
+                </a:solidFill>
+              </a:rPr>
+              <a:t>“A field </a:t>
+            </a:r>
+            <a:r>
+              <a:rPr lang="en-US" sz="1200" i="1" dirty="0">
+                <a:solidFill>
+                  <a:schemeClr val="bg2"/>
+                </a:solidFill>
+              </a:rPr>
+              <a:t>study of refactoring challenges and </a:t>
+            </a:r>
+            <a:r>
+              <a:rPr lang="en-US" sz="1200" i="1" dirty="0" smtClean="0">
+                <a:solidFill>
+                  <a:schemeClr val="bg2"/>
+                </a:solidFill>
+              </a:rPr>
+              <a:t>benefits”, </a:t>
+            </a:r>
+            <a:r>
+              <a:rPr lang="fr-FR" sz="1200" i="1" dirty="0" smtClean="0">
+                <a:solidFill>
+                  <a:schemeClr val="bg2"/>
+                </a:solidFill>
+              </a:rPr>
+              <a:t>2012.</a:t>
+            </a:r>
+            <a:endParaRPr lang="fr-FR" sz="1200" i="1" dirty="0">
+              <a:solidFill>
+                <a:schemeClr val="bg2"/>
+              </a:solidFill>
+            </a:endParaRPr>
+          </a:p>
+        </p:txBody>
+      </p:sp>
     </p:spTree>
   </p:cSld>
   <p:clrMapOvr>

</xml_diff>